<commit_message>
Updated lectures 9 & 10
</commit_message>
<xml_diff>
--- a/Lectures/CITS1003-8 Incidents.pptx
+++ b/Lectures/CITS1003-8 Incidents.pptx
@@ -5494,7 +5494,7 @@
           <a:p>
             <a:fld id="{6D6D7260-B7E4-B548-BD1F-84ED14536037}" type="datetimeFigureOut">
               <a:rPr lang="en-AU" smtClean="0"/>
-              <a:t>14/8/21</a:t>
+              <a:t>16/9/21</a:t>
             </a:fld>
             <a:endParaRPr lang="en-AU"/>
           </a:p>
@@ -7543,7 +7543,7 @@
           <a:p>
             <a:fld id="{88D38747-4367-4BD2-8D51-C97E202738E2}" type="datetime1">
               <a:rPr lang="en-US" smtClean="0"/>
-              <a:t>8/14/21</a:t>
+              <a:t>9/16/21</a:t>
             </a:fld>
             <a:endParaRPr lang="en-US" dirty="0"/>
           </a:p>
@@ -7848,7 +7848,7 @@
           <a:p>
             <a:fld id="{11F1B079-7EF0-44EE-B798-BCC497C9F3B2}" type="datetime1">
               <a:rPr lang="en-US" smtClean="0"/>
-              <a:t>8/14/21</a:t>
+              <a:t>9/16/21</a:t>
             </a:fld>
             <a:endParaRPr lang="en-US" dirty="0"/>
           </a:p>
@@ -8042,7 +8042,7 @@
           <a:p>
             <a:fld id="{28FF70A8-1D13-4657-95F0-A9EA54967B8D}" type="datetime1">
               <a:rPr lang="en-US" smtClean="0"/>
-              <a:t>8/14/21</a:t>
+              <a:t>9/16/21</a:t>
             </a:fld>
             <a:endParaRPr lang="en-US" dirty="0"/>
           </a:p>
@@ -8305,7 +8305,7 @@
           <a:p>
             <a:fld id="{21EB90AC-71BD-4C7F-8ACA-7B3F18292E63}" type="datetime1">
               <a:rPr lang="en-US" smtClean="0"/>
-              <a:t>8/14/21</a:t>
+              <a:t>9/16/21</a:t>
             </a:fld>
             <a:endParaRPr lang="en-US" dirty="0"/>
           </a:p>
@@ -8741,7 +8741,7 @@
           <a:p>
             <a:fld id="{4E6EFC2C-8905-46F0-B443-CE905B76BA01}" type="datetime1">
               <a:rPr lang="en-US" smtClean="0"/>
-              <a:t>8/14/21</a:t>
+              <a:t>9/16/21</a:t>
             </a:fld>
             <a:endParaRPr lang="en-US" dirty="0"/>
           </a:p>
@@ -9278,7 +9278,7 @@
           <a:p>
             <a:fld id="{D9079DC3-C9B5-499E-9140-0DC28B7074E2}" type="datetime1">
               <a:rPr lang="en-US" smtClean="0"/>
-              <a:t>8/14/21</a:t>
+              <a:t>9/16/21</a:t>
             </a:fld>
             <a:endParaRPr lang="en-US" dirty="0"/>
           </a:p>
@@ -10160,7 +10160,7 @@
           <a:p>
             <a:fld id="{30BB33EA-E472-4D22-9C03-A9C14AA21CED}" type="datetime1">
               <a:rPr lang="en-US" smtClean="0"/>
-              <a:t>8/14/21</a:t>
+              <a:t>9/16/21</a:t>
             </a:fld>
             <a:endParaRPr lang="en-US" dirty="0"/>
           </a:p>
@@ -10330,7 +10330,7 @@
           <a:p>
             <a:fld id="{217E833E-1B6D-415F-AD29-75AE8C43BD0D}" type="datetime1">
               <a:rPr lang="en-US" smtClean="0"/>
-              <a:t>8/14/21</a:t>
+              <a:t>9/16/21</a:t>
             </a:fld>
             <a:endParaRPr lang="en-US" dirty="0"/>
           </a:p>
@@ -10514,7 +10514,7 @@
           <a:p>
             <a:fld id="{8452596F-08A7-4B70-989A-F2B1CF31E66B}" type="datetime1">
               <a:rPr lang="en-US" smtClean="0"/>
-              <a:t>8/14/21</a:t>
+              <a:t>9/16/21</a:t>
             </a:fld>
             <a:endParaRPr lang="en-US" dirty="0"/>
           </a:p>
@@ -10684,7 +10684,7 @@
           <a:p>
             <a:fld id="{73C55A3C-5767-4844-A0A3-83778C2E5409}" type="datetime1">
               <a:rPr lang="en-US" smtClean="0"/>
-              <a:t>8/14/21</a:t>
+              <a:t>9/16/21</a:t>
             </a:fld>
             <a:endParaRPr lang="en-US" dirty="0"/>
           </a:p>
@@ -10928,7 +10928,7 @@
           <a:p>
             <a:fld id="{CAE507A8-A5CF-4D38-AB86-7EDDA87A85D4}" type="datetime1">
               <a:rPr lang="en-US" smtClean="0"/>
-              <a:t>8/14/21</a:t>
+              <a:t>9/16/21</a:t>
             </a:fld>
             <a:endParaRPr lang="en-US" dirty="0"/>
           </a:p>
@@ -11170,7 +11170,7 @@
           <a:p>
             <a:fld id="{BDFCD27C-8599-43EF-BA1D-14DDC1946E06}" type="datetime1">
               <a:rPr lang="en-US" smtClean="0"/>
-              <a:t>8/14/21</a:t>
+              <a:t>9/16/21</a:t>
             </a:fld>
             <a:endParaRPr lang="en-US" dirty="0"/>
           </a:p>
@@ -11651,7 +11651,7 @@
           <a:p>
             <a:fld id="{49343D99-809A-49C0-96E5-4250D0B498EE}" type="datetime1">
               <a:rPr lang="en-US" smtClean="0"/>
-              <a:t>8/14/21</a:t>
+              <a:t>9/16/21</a:t>
             </a:fld>
             <a:endParaRPr lang="en-US" dirty="0"/>
           </a:p>
@@ -11769,7 +11769,7 @@
           <a:p>
             <a:fld id="{A143DE9B-B678-4EFB-BB7D-A4370204A0B0}" type="datetime1">
               <a:rPr lang="en-US" smtClean="0"/>
-              <a:t>8/14/21</a:t>
+              <a:t>9/16/21</a:t>
             </a:fld>
             <a:endParaRPr lang="en-US" dirty="0"/>
           </a:p>
@@ -11864,7 +11864,7 @@
           <a:p>
             <a:fld id="{E68812DA-F765-4142-A6A3-A8ED7235E082}" type="datetime1">
               <a:rPr lang="en-US" smtClean="0"/>
-              <a:t>8/14/21</a:t>
+              <a:t>9/16/21</a:t>
             </a:fld>
             <a:endParaRPr lang="en-US" dirty="0"/>
           </a:p>
@@ -12119,7 +12119,7 @@
           <a:p>
             <a:fld id="{3E0277FD-7DE6-41D4-930D-AC99F5AFE54E}" type="datetime1">
               <a:rPr lang="en-US" smtClean="0"/>
-              <a:t>8/14/21</a:t>
+              <a:t>9/16/21</a:t>
             </a:fld>
             <a:endParaRPr lang="en-US" dirty="0"/>
           </a:p>
@@ -12426,7 +12426,7 @@
           <a:p>
             <a:fld id="{9EA15526-7079-4B7B-987C-1B5FAE11A0FF}" type="datetime1">
               <a:rPr lang="en-US" smtClean="0"/>
-              <a:t>8/14/21</a:t>
+              <a:t>9/16/21</a:t>
             </a:fld>
             <a:endParaRPr lang="en-US" dirty="0"/>
           </a:p>
@@ -12661,7 +12661,7 @@
           <a:p>
             <a:fld id="{073ED0CC-082F-4160-86E5-0D6041F12778}" type="datetime1">
               <a:rPr lang="en-US" smtClean="0"/>
-              <a:t>8/14/21</a:t>
+              <a:t>9/16/21</a:t>
             </a:fld>
             <a:endParaRPr lang="en-US" dirty="0"/>
           </a:p>
@@ -13572,7 +13572,7 @@
           </a:effectLst>
           <a:extLst>
             <a:ext uri="{91240B29-F687-4f45-9708-019B960494DF}">
-              <a14:hiddenLine xmlns:a16="http://schemas.microsoft.com/office/drawing/2014/main" xmlns:p14="http://schemas.microsoft.com/office/powerpoint/2010/main" xmlns:a14="http://schemas.microsoft.com/office/drawing/2010/main" xmlns="" w="9525">
+              <a14:hiddenLine xmlns="" xmlns:a14="http://schemas.microsoft.com/office/drawing/2010/main" xmlns:p14="http://schemas.microsoft.com/office/powerpoint/2010/main" xmlns:a16="http://schemas.microsoft.com/office/drawing/2014/main" w="9525">
                 <a:solidFill>
                   <a:srgbClr val="000000"/>
                 </a:solidFill>
@@ -14568,6 +14568,1164 @@
       <p:sp useBgFill="1">
         <p:nvSpPr>
           <p:cNvPr id="73" name="Freeform 5">
+            <a:extLst>
+              <a:ext uri="{FF2B5EF4-FFF2-40B4-BE49-F238E27FC236}">
+                <a16:creationId xmlns:a16="http://schemas.microsoft.com/office/drawing/2014/main" id="{37D54B6C-87D0-4C03-8335-3955179D2B5B}"/>
+              </a:ext>
+              <a:ext uri="{C183D7F6-B498-43B3-948B-1728B52AA6E4}">
+                <adec:decorative xmlns:adec="http://schemas.microsoft.com/office/drawing/2017/decorative" val="1"/>
+              </a:ext>
+            </a:extLst>
+          </p:cNvPr>
+          <p:cNvSpPr>
+            <a:spLocks noGrp="1" noRot="1" noChangeAspect="1" noMove="1" noResize="1" noEditPoints="1" noAdjustHandles="1" noChangeArrowheads="1" noChangeShapeType="1" noTextEdit="1"/>
+          </p:cNvSpPr>
+          <p:nvPr>
+            <p:extLst>
+              <p:ext uri="{386F3935-93C4-4BCD-93E2-E3B085C9AB24}">
+                <p16:designElem xmlns:p16="http://schemas.microsoft.com/office/powerpoint/2015/main" val="1"/>
+              </p:ext>
+            </p:extLst>
+          </p:nvPr>
+        </p:nvSpPr>
+        <p:spPr bwMode="auto">
+          <a:xfrm rot="5400000">
+            <a:off x="-118536" y="1371603"/>
+            <a:ext cx="5624423" cy="4100418"/>
+          </a:xfrm>
+          <a:custGeom>
+            <a:avLst/>
+            <a:gdLst>
+              <a:gd name="T0" fmla="*/ 1577 w 1601"/>
+              <a:gd name="T1" fmla="*/ 0 h 696"/>
+              <a:gd name="T2" fmla="*/ 833 w 1601"/>
+              <a:gd name="T3" fmla="*/ 0 h 696"/>
+              <a:gd name="T4" fmla="*/ 768 w 1601"/>
+              <a:gd name="T5" fmla="*/ 0 h 696"/>
+              <a:gd name="T6" fmla="*/ 24 w 1601"/>
+              <a:gd name="T7" fmla="*/ 0 h 696"/>
+              <a:gd name="T8" fmla="*/ 0 w 1601"/>
+              <a:gd name="T9" fmla="*/ 27 h 696"/>
+              <a:gd name="T10" fmla="*/ 0 w 1601"/>
+              <a:gd name="T11" fmla="*/ 669 h 696"/>
+              <a:gd name="T12" fmla="*/ 24 w 1601"/>
+              <a:gd name="T13" fmla="*/ 696 h 696"/>
+              <a:gd name="T14" fmla="*/ 768 w 1601"/>
+              <a:gd name="T15" fmla="*/ 696 h 696"/>
+              <a:gd name="T16" fmla="*/ 833 w 1601"/>
+              <a:gd name="T17" fmla="*/ 696 h 696"/>
+              <a:gd name="T18" fmla="*/ 1577 w 1601"/>
+              <a:gd name="T19" fmla="*/ 696 h 696"/>
+              <a:gd name="T20" fmla="*/ 1601 w 1601"/>
+              <a:gd name="T21" fmla="*/ 669 h 696"/>
+              <a:gd name="T22" fmla="*/ 1601 w 1601"/>
+              <a:gd name="T23" fmla="*/ 27 h 696"/>
+              <a:gd name="T24" fmla="*/ 1577 w 1601"/>
+              <a:gd name="T25" fmla="*/ 0 h 696"/>
+            </a:gdLst>
+            <a:ahLst/>
+            <a:cxnLst>
+              <a:cxn ang="0">
+                <a:pos x="T0" y="T1"/>
+              </a:cxn>
+              <a:cxn ang="0">
+                <a:pos x="T2" y="T3"/>
+              </a:cxn>
+              <a:cxn ang="0">
+                <a:pos x="T4" y="T5"/>
+              </a:cxn>
+              <a:cxn ang="0">
+                <a:pos x="T6" y="T7"/>
+              </a:cxn>
+              <a:cxn ang="0">
+                <a:pos x="T8" y="T9"/>
+              </a:cxn>
+              <a:cxn ang="0">
+                <a:pos x="T10" y="T11"/>
+              </a:cxn>
+              <a:cxn ang="0">
+                <a:pos x="T12" y="T13"/>
+              </a:cxn>
+              <a:cxn ang="0">
+                <a:pos x="T14" y="T15"/>
+              </a:cxn>
+              <a:cxn ang="0">
+                <a:pos x="T16" y="T17"/>
+              </a:cxn>
+              <a:cxn ang="0">
+                <a:pos x="T18" y="T19"/>
+              </a:cxn>
+              <a:cxn ang="0">
+                <a:pos x="T20" y="T21"/>
+              </a:cxn>
+              <a:cxn ang="0">
+                <a:pos x="T22" y="T23"/>
+              </a:cxn>
+              <a:cxn ang="0">
+                <a:pos x="T24" y="T25"/>
+              </a:cxn>
+            </a:cxnLst>
+            <a:rect l="0" t="0" r="r" b="b"/>
+            <a:pathLst>
+              <a:path w="1601" h="696">
+                <a:moveTo>
+                  <a:pt x="1577" y="0"/>
+                </a:moveTo>
+                <a:cubicBezTo>
+                  <a:pt x="833" y="0"/>
+                  <a:pt x="833" y="0"/>
+                  <a:pt x="833" y="0"/>
+                </a:cubicBezTo>
+                <a:cubicBezTo>
+                  <a:pt x="768" y="0"/>
+                  <a:pt x="768" y="0"/>
+                  <a:pt x="768" y="0"/>
+                </a:cubicBezTo>
+                <a:cubicBezTo>
+                  <a:pt x="24" y="0"/>
+                  <a:pt x="24" y="0"/>
+                  <a:pt x="24" y="0"/>
+                </a:cubicBezTo>
+                <a:cubicBezTo>
+                  <a:pt x="11" y="0"/>
+                  <a:pt x="0" y="12"/>
+                  <a:pt x="0" y="27"/>
+                </a:cubicBezTo>
+                <a:cubicBezTo>
+                  <a:pt x="0" y="669"/>
+                  <a:pt x="0" y="669"/>
+                  <a:pt x="0" y="669"/>
+                </a:cubicBezTo>
+                <a:cubicBezTo>
+                  <a:pt x="0" y="684"/>
+                  <a:pt x="11" y="696"/>
+                  <a:pt x="24" y="696"/>
+                </a:cubicBezTo>
+                <a:cubicBezTo>
+                  <a:pt x="768" y="696"/>
+                  <a:pt x="768" y="696"/>
+                  <a:pt x="768" y="696"/>
+                </a:cubicBezTo>
+                <a:cubicBezTo>
+                  <a:pt x="833" y="696"/>
+                  <a:pt x="833" y="696"/>
+                  <a:pt x="833" y="696"/>
+                </a:cubicBezTo>
+                <a:cubicBezTo>
+                  <a:pt x="1577" y="696"/>
+                  <a:pt x="1577" y="696"/>
+                  <a:pt x="1577" y="696"/>
+                </a:cubicBezTo>
+                <a:cubicBezTo>
+                  <a:pt x="1590" y="696"/>
+                  <a:pt x="1601" y="684"/>
+                  <a:pt x="1601" y="669"/>
+                </a:cubicBezTo>
+                <a:cubicBezTo>
+                  <a:pt x="1601" y="27"/>
+                  <a:pt x="1601" y="27"/>
+                  <a:pt x="1601" y="27"/>
+                </a:cubicBezTo>
+                <a:cubicBezTo>
+                  <a:pt x="1601" y="12"/>
+                  <a:pt x="1590" y="0"/>
+                  <a:pt x="1577" y="0"/>
+                </a:cubicBezTo>
+                <a:close/>
+              </a:path>
+            </a:pathLst>
+          </a:custGeom>
+          <a:ln>
+            <a:noFill/>
+          </a:ln>
+          <a:effectLst>
+            <a:outerShdw blurRad="50800" dist="38100" dir="5400000" algn="tl" rotWithShape="0">
+              <a:srgbClr val="000000">
+                <a:alpha val="43000"/>
+              </a:srgbClr>
+            </a:outerShdw>
+          </a:effectLst>
+          <a:extLst>
+            <a:ext uri="{91240B29-F687-4f45-9708-019B960494DF}">
+              <a14:hiddenLine xmlns="" xmlns:a14="http://schemas.microsoft.com/office/drawing/2010/main" xmlns:p14="http://schemas.microsoft.com/office/powerpoint/2010/main" xmlns:a16="http://schemas.microsoft.com/office/drawing/2014/main" w="9525">
+                <a:solidFill>
+                  <a:srgbClr val="000000"/>
+                </a:solidFill>
+                <a:round/>
+                <a:headEnd/>
+                <a:tailEnd/>
+              </a14:hiddenLine>
+            </a:ext>
+          </a:extLst>
+        </p:spPr>
+        <p:txBody>
+          <a:bodyPr vert="horz" wrap="square" lIns="91440" tIns="45720" rIns="91440" bIns="45720" numCol="1" anchor="t" anchorCtr="0" compatLnSpc="1">
+            <a:prstTxWarp prst="textNoShape">
+              <a:avLst/>
+            </a:prstTxWarp>
+          </a:bodyPr>
+          <a:lstStyle/>
+          <a:p>
+            <a:endParaRPr lang="en-US"/>
+          </a:p>
+        </p:txBody>
+      </p:sp>
+      <p:sp>
+        <p:nvSpPr>
+          <p:cNvPr id="2" name="Title 1">
+            <a:extLst>
+              <a:ext uri="{FF2B5EF4-FFF2-40B4-BE49-F238E27FC236}">
+                <a16:creationId xmlns:a16="http://schemas.microsoft.com/office/drawing/2014/main" id="{07F6FF8C-A74B-E640-AF2F-9B4E07A213CF}"/>
+              </a:ext>
+            </a:extLst>
+          </p:cNvPr>
+          <p:cNvSpPr>
+            <a:spLocks noGrp="1"/>
+          </p:cNvSpPr>
+          <p:nvPr>
+            <p:ph type="title"/>
+          </p:nvPr>
+        </p:nvSpPr>
+        <p:spPr>
+          <a:xfrm>
+            <a:off x="1039905" y="845387"/>
+            <a:ext cx="3470310" cy="1066689"/>
+          </a:xfrm>
+        </p:spPr>
+        <p:txBody>
+          <a:bodyPr anchor="b">
+            <a:normAutofit/>
+          </a:bodyPr>
+          <a:lstStyle/>
+          <a:p>
+            <a:pPr algn="l"/>
+            <a:r>
+              <a:rPr lang="en-AU" sz="2400"/>
+              <a:t>Pyramid of Pain</a:t>
+            </a:r>
+          </a:p>
+        </p:txBody>
+      </p:sp>
+      <p:sp>
+        <p:nvSpPr>
+          <p:cNvPr id="3" name="Content Placeholder 2">
+            <a:extLst>
+              <a:ext uri="{FF2B5EF4-FFF2-40B4-BE49-F238E27FC236}">
+                <a16:creationId xmlns:a16="http://schemas.microsoft.com/office/drawing/2014/main" id="{C29FA815-F1A1-E848-8BE0-A481039CE411}"/>
+              </a:ext>
+            </a:extLst>
+          </p:cNvPr>
+          <p:cNvSpPr>
+            <a:spLocks noGrp="1"/>
+          </p:cNvSpPr>
+          <p:nvPr>
+            <p:ph idx="1"/>
+          </p:nvPr>
+        </p:nvSpPr>
+        <p:spPr>
+          <a:xfrm>
+            <a:off x="1039905" y="2147862"/>
+            <a:ext cx="3405573" cy="3499563"/>
+          </a:xfrm>
+        </p:spPr>
+        <p:txBody>
+          <a:bodyPr anchor="t">
+            <a:normAutofit/>
+          </a:bodyPr>
+          <a:lstStyle/>
+          <a:p>
+            <a:r>
+              <a:rPr lang="en-AU" sz="1600" dirty="0">
+                <a:effectLst/>
+              </a:rPr>
+              <a:t>David J Bianco developed this idea in 2013</a:t>
+            </a:r>
+          </a:p>
+          <a:p>
+            <a:r>
+              <a:rPr lang="en-AU" sz="1600" dirty="0">
+                <a:effectLst/>
+              </a:rPr>
+              <a:t>TTPs sit at the top of the </a:t>
+            </a:r>
+            <a:r>
+              <a:rPr lang="en-AU" sz="1600" dirty="0" err="1">
+                <a:effectLst/>
+              </a:rPr>
+              <a:t>IoCs</a:t>
+            </a:r>
+            <a:r>
+              <a:rPr lang="en-AU" sz="1600" dirty="0">
+                <a:effectLst/>
+              </a:rPr>
+              <a:t> and are thought to be the hardest thing to change because of the time, money and effort that goes into developing skills and infrastructure </a:t>
+            </a:r>
+          </a:p>
+          <a:p>
+            <a:r>
+              <a:rPr lang="en-AU" sz="1600" dirty="0">
+                <a:effectLst/>
+              </a:rPr>
+              <a:t>Because of this they are thought to be a marker of a threat actor group</a:t>
+            </a:r>
+          </a:p>
+          <a:p>
+            <a:endParaRPr lang="en-AU" sz="1600" dirty="0"/>
+          </a:p>
+          <a:p>
+            <a:endParaRPr lang="en-US" sz="1600" dirty="0"/>
+          </a:p>
+          <a:p>
+            <a:pPr marL="36900" indent="0">
+              <a:buNone/>
+            </a:pPr>
+            <a:endParaRPr lang="en-AU" sz="1600" dirty="0">
+              <a:effectLst/>
+            </a:endParaRPr>
+          </a:p>
+          <a:p>
+            <a:endParaRPr lang="en-AU" sz="1600" dirty="0"/>
+          </a:p>
+        </p:txBody>
+      </p:sp>
+      <p:pic>
+        <p:nvPicPr>
+          <p:cNvPr id="1026" name="Picture 2">
+            <a:extLst>
+              <a:ext uri="{FF2B5EF4-FFF2-40B4-BE49-F238E27FC236}">
+                <a16:creationId xmlns:a16="http://schemas.microsoft.com/office/drawing/2014/main" id="{020FACBB-D6CA-EE46-BA7D-125E962B7793}"/>
+              </a:ext>
+            </a:extLst>
+          </p:cNvPr>
+          <p:cNvPicPr>
+            <a:picLocks noChangeAspect="1" noChangeArrowheads="1"/>
+          </p:cNvPicPr>
+          <p:nvPr/>
+        </p:nvPicPr>
+        <p:blipFill>
+          <a:blip r:embed="rId4">
+            <a:extLst>
+              <a:ext uri="{28A0092B-C50C-407E-A947-70E740481C1C}">
+                <a14:useLocalDpi xmlns:a14="http://schemas.microsoft.com/office/drawing/2010/main" val="0"/>
+              </a:ext>
+            </a:extLst>
+          </a:blip>
+          <a:stretch>
+            <a:fillRect/>
+          </a:stretch>
+        </p:blipFill>
+        <p:spPr bwMode="auto">
+          <a:xfrm>
+            <a:off x="5387351" y="1433076"/>
+            <a:ext cx="6161183" cy="4001593"/>
+          </a:xfrm>
+          <a:prstGeom prst="rect">
+            <a:avLst/>
+          </a:prstGeom>
+          <a:noFill/>
+          <a:extLst>
+            <a:ext uri="{909E8E84-426E-40DD-AFC4-6F175D3DCCD1}">
+              <a14:hiddenFill xmlns:a14="http://schemas.microsoft.com/office/drawing/2010/main">
+                <a:solidFill>
+                  <a:srgbClr val="FFFFFF"/>
+                </a:solidFill>
+              </a14:hiddenFill>
+            </a:ext>
+          </a:extLst>
+        </p:spPr>
+      </p:pic>
+    </p:spTree>
+    <p:extLst>
+      <p:ext uri="{BB962C8B-B14F-4D97-AF65-F5344CB8AC3E}">
+        <p14:creationId xmlns:p14="http://schemas.microsoft.com/office/powerpoint/2010/main" val="3599752435"/>
+      </p:ext>
+    </p:extLst>
+  </p:cSld>
+  <p:clrMapOvr>
+    <a:masterClrMapping/>
+  </p:clrMapOvr>
+</p:sld>
+</file>
+
+<file path=ppt/slides/slide16.xml><?xml version="1.0" encoding="utf-8"?>
+<p:sld xmlns:a="http://schemas.openxmlformats.org/drawingml/2006/main" xmlns:r="http://schemas.openxmlformats.org/officeDocument/2006/relationships" xmlns:p="http://schemas.openxmlformats.org/presentationml/2006/main">
+  <p:cSld>
+    <p:spTree>
+      <p:nvGrpSpPr>
+        <p:cNvPr id="1" name=""/>
+        <p:cNvGrpSpPr/>
+        <p:nvPr/>
+      </p:nvGrpSpPr>
+      <p:grpSpPr>
+        <a:xfrm>
+          <a:off x="0" y="0"/>
+          <a:ext cx="0" cy="0"/>
+          <a:chOff x="0" y="0"/>
+          <a:chExt cx="0" cy="0"/>
+        </a:xfrm>
+      </p:grpSpPr>
+      <p:sp>
+        <p:nvSpPr>
+          <p:cNvPr id="2" name="Title 1">
+            <a:extLst>
+              <a:ext uri="{FF2B5EF4-FFF2-40B4-BE49-F238E27FC236}">
+                <a16:creationId xmlns:a16="http://schemas.microsoft.com/office/drawing/2014/main" id="{07F6FF8C-A74B-E640-AF2F-9B4E07A213CF}"/>
+              </a:ext>
+            </a:extLst>
+          </p:cNvPr>
+          <p:cNvSpPr>
+            <a:spLocks noGrp="1"/>
+          </p:cNvSpPr>
+          <p:nvPr>
+            <p:ph type="title"/>
+          </p:nvPr>
+        </p:nvSpPr>
+        <p:spPr/>
+        <p:txBody>
+          <a:bodyPr/>
+          <a:lstStyle/>
+          <a:p>
+            <a:r>
+              <a:rPr lang="en-AU" dirty="0"/>
+              <a:t>Attribution</a:t>
+            </a:r>
+          </a:p>
+        </p:txBody>
+      </p:sp>
+      <p:sp>
+        <p:nvSpPr>
+          <p:cNvPr id="3" name="Content Placeholder 2">
+            <a:extLst>
+              <a:ext uri="{FF2B5EF4-FFF2-40B4-BE49-F238E27FC236}">
+                <a16:creationId xmlns:a16="http://schemas.microsoft.com/office/drawing/2014/main" id="{C29FA815-F1A1-E848-8BE0-A481039CE411}"/>
+              </a:ext>
+            </a:extLst>
+          </p:cNvPr>
+          <p:cNvSpPr>
+            <a:spLocks noGrp="1"/>
+          </p:cNvSpPr>
+          <p:nvPr>
+            <p:ph idx="1"/>
+          </p:nvPr>
+        </p:nvSpPr>
+        <p:spPr/>
+        <p:txBody>
+          <a:bodyPr>
+            <a:normAutofit fontScale="92500"/>
+          </a:bodyPr>
+          <a:lstStyle/>
+          <a:p>
+            <a:r>
+              <a:rPr lang="en-AU" b="1" dirty="0">
+                <a:effectLst/>
+              </a:rPr>
+              <a:t>Attribution to a particular threat actor group is supposed to help because:</a:t>
+            </a:r>
+          </a:p>
+          <a:p>
+            <a:pPr lvl="1"/>
+            <a:r>
+              <a:rPr lang="en-AU" b="1" dirty="0">
+                <a:effectLst/>
+              </a:rPr>
+              <a:t>It reveals motivations and objectives of the attackers and so can potentially help in stopping progression of an attack</a:t>
+            </a:r>
+          </a:p>
+          <a:p>
+            <a:pPr lvl="1"/>
+            <a:r>
+              <a:rPr lang="en-AU" b="1" dirty="0">
+                <a:effectLst/>
+              </a:rPr>
+              <a:t>Helps understand the impact of the attack e.g. crime vs espionage</a:t>
+            </a:r>
+          </a:p>
+          <a:p>
+            <a:r>
+              <a:rPr lang="en-AU" b="1" dirty="0">
+                <a:effectLst/>
+              </a:rPr>
+              <a:t>MITRE ATT&amp;CK framework is based entirely on this premise. Contains information about 110 different groups and hundreds of TTPs</a:t>
+            </a:r>
+          </a:p>
+          <a:p>
+            <a:r>
+              <a:rPr lang="en-AU" b="1" dirty="0">
+                <a:effectLst/>
+              </a:rPr>
+              <a:t>Problems with this when you look at the actual distribution and uniqueness of the TTPs however</a:t>
+            </a:r>
+          </a:p>
+          <a:p>
+            <a:r>
+              <a:rPr lang="en-AU" b="1" dirty="0">
+                <a:effectLst/>
+              </a:rPr>
+              <a:t>Attribution is a very difficult topic as it is so open to False Flags and geopolitical posturing</a:t>
+            </a:r>
+          </a:p>
+          <a:p>
+            <a:endParaRPr lang="en-AU" dirty="0">
+              <a:effectLst/>
+            </a:endParaRPr>
+          </a:p>
+          <a:p>
+            <a:endParaRPr lang="en-AU" dirty="0"/>
+          </a:p>
+          <a:p>
+            <a:endParaRPr lang="en-US" dirty="0"/>
+          </a:p>
+          <a:p>
+            <a:pPr marL="36900" indent="0">
+              <a:buNone/>
+            </a:pPr>
+            <a:endParaRPr lang="en-AU" dirty="0">
+              <a:effectLst/>
+            </a:endParaRPr>
+          </a:p>
+          <a:p>
+            <a:endParaRPr lang="en-AU" sz="2000" dirty="0"/>
+          </a:p>
+        </p:txBody>
+      </p:sp>
+    </p:spTree>
+    <p:extLst>
+      <p:ext uri="{BB962C8B-B14F-4D97-AF65-F5344CB8AC3E}">
+        <p14:creationId xmlns:p14="http://schemas.microsoft.com/office/powerpoint/2010/main" val="1948589966"/>
+      </p:ext>
+    </p:extLst>
+  </p:cSld>
+  <p:clrMapOvr>
+    <a:masterClrMapping/>
+  </p:clrMapOvr>
+</p:sld>
+</file>
+
+<file path=ppt/slides/slide17.xml><?xml version="1.0" encoding="utf-8"?>
+<p:sld xmlns:a="http://schemas.openxmlformats.org/drawingml/2006/main" xmlns:r="http://schemas.openxmlformats.org/officeDocument/2006/relationships" xmlns:p="http://schemas.openxmlformats.org/presentationml/2006/main">
+  <p:cSld>
+    <p:spTree>
+      <p:nvGrpSpPr>
+        <p:cNvPr id="1" name=""/>
+        <p:cNvGrpSpPr/>
+        <p:nvPr/>
+      </p:nvGrpSpPr>
+      <p:grpSpPr>
+        <a:xfrm>
+          <a:off x="0" y="0"/>
+          <a:ext cx="0" cy="0"/>
+          <a:chOff x="0" y="0"/>
+          <a:chExt cx="0" cy="0"/>
+        </a:xfrm>
+      </p:grpSpPr>
+      <p:sp>
+        <p:nvSpPr>
+          <p:cNvPr id="2" name="Title 1">
+            <a:extLst>
+              <a:ext uri="{FF2B5EF4-FFF2-40B4-BE49-F238E27FC236}">
+                <a16:creationId xmlns:a16="http://schemas.microsoft.com/office/drawing/2014/main" id="{07F6FF8C-A74B-E640-AF2F-9B4E07A213CF}"/>
+              </a:ext>
+            </a:extLst>
+          </p:cNvPr>
+          <p:cNvSpPr>
+            <a:spLocks noGrp="1"/>
+          </p:cNvSpPr>
+          <p:nvPr>
+            <p:ph type="title"/>
+          </p:nvPr>
+        </p:nvSpPr>
+        <p:spPr/>
+        <p:txBody>
+          <a:bodyPr/>
+          <a:lstStyle/>
+          <a:p>
+            <a:r>
+              <a:rPr lang="en-AU" dirty="0"/>
+              <a:t>Incident Containment Eradication &amp; Recovery</a:t>
+            </a:r>
+          </a:p>
+        </p:txBody>
+      </p:sp>
+      <p:sp>
+        <p:nvSpPr>
+          <p:cNvPr id="3" name="Content Placeholder 2">
+            <a:extLst>
+              <a:ext uri="{FF2B5EF4-FFF2-40B4-BE49-F238E27FC236}">
+                <a16:creationId xmlns:a16="http://schemas.microsoft.com/office/drawing/2014/main" id="{C29FA815-F1A1-E848-8BE0-A481039CE411}"/>
+              </a:ext>
+            </a:extLst>
+          </p:cNvPr>
+          <p:cNvSpPr>
+            <a:spLocks noGrp="1"/>
+          </p:cNvSpPr>
+          <p:nvPr>
+            <p:ph idx="1"/>
+          </p:nvPr>
+        </p:nvSpPr>
+        <p:spPr>
+          <a:xfrm>
+            <a:off x="913795" y="2076450"/>
+            <a:ext cx="10353762" cy="4171950"/>
+          </a:xfrm>
+        </p:spPr>
+        <p:txBody>
+          <a:bodyPr>
+            <a:normAutofit fontScale="77500" lnSpcReduction="20000"/>
+          </a:bodyPr>
+          <a:lstStyle/>
+          <a:p>
+            <a:r>
+              <a:rPr lang="en-AU" b="1" dirty="0">
+                <a:effectLst/>
+              </a:rPr>
+              <a:t>The first challenge is containment to stop further impact. This may involve:</a:t>
+            </a:r>
+          </a:p>
+          <a:p>
+            <a:pPr lvl="1"/>
+            <a:r>
+              <a:rPr lang="en-AU" b="1" dirty="0">
+                <a:effectLst/>
+              </a:rPr>
+              <a:t>Disabling accounts</a:t>
+            </a:r>
+          </a:p>
+          <a:p>
+            <a:pPr lvl="1"/>
+            <a:r>
+              <a:rPr lang="en-AU" b="1" dirty="0">
+                <a:effectLst/>
+              </a:rPr>
+              <a:t>Blocking network traffic </a:t>
+            </a:r>
+          </a:p>
+          <a:p>
+            <a:pPr lvl="1"/>
+            <a:r>
+              <a:rPr lang="en-AU" b="1" dirty="0">
+                <a:effectLst/>
+              </a:rPr>
+              <a:t>Isolating a computer or segment of the network</a:t>
+            </a:r>
+          </a:p>
+          <a:p>
+            <a:r>
+              <a:rPr lang="en-AU" b="1" dirty="0">
+                <a:effectLst/>
+              </a:rPr>
+              <a:t>Balance the strategy against:</a:t>
+            </a:r>
+          </a:p>
+          <a:p>
+            <a:pPr lvl="1"/>
+            <a:r>
+              <a:rPr lang="en-AU" b="1" dirty="0">
+                <a:effectLst/>
+              </a:rPr>
+              <a:t>Potential damage to and theft of resources</a:t>
+            </a:r>
+          </a:p>
+          <a:p>
+            <a:pPr lvl="1"/>
+            <a:r>
+              <a:rPr lang="en-AU" b="1" dirty="0">
+                <a:effectLst/>
+              </a:rPr>
+              <a:t>Need for evidence preservation</a:t>
+            </a:r>
+          </a:p>
+          <a:p>
+            <a:pPr lvl="1"/>
+            <a:r>
+              <a:rPr lang="en-AU" b="1" dirty="0">
+                <a:effectLst/>
+              </a:rPr>
+              <a:t>Service availability</a:t>
+            </a:r>
+          </a:p>
+          <a:p>
+            <a:pPr lvl="1"/>
+            <a:r>
+              <a:rPr lang="en-AU" b="1" dirty="0">
+                <a:effectLst/>
+              </a:rPr>
+              <a:t>Time and resources needed</a:t>
+            </a:r>
+          </a:p>
+          <a:p>
+            <a:pPr lvl="1"/>
+            <a:r>
+              <a:rPr lang="en-AU" b="1" dirty="0">
+                <a:effectLst/>
+              </a:rPr>
+              <a:t>Effectiveness of the strategy</a:t>
+            </a:r>
+          </a:p>
+          <a:p>
+            <a:pPr lvl="1"/>
+            <a:r>
+              <a:rPr lang="en-AU" b="1" dirty="0">
+                <a:effectLst/>
+              </a:rPr>
+              <a:t>Duration</a:t>
+            </a:r>
+          </a:p>
+          <a:p>
+            <a:pPr lvl="1"/>
+            <a:r>
+              <a:rPr lang="en-AU" b="1" dirty="0">
+                <a:effectLst/>
+              </a:rPr>
+              <a:t>Alerting the attackers</a:t>
+            </a:r>
+          </a:p>
+          <a:p>
+            <a:r>
+              <a:rPr lang="en-AU" b="1" dirty="0">
+                <a:effectLst/>
+              </a:rPr>
+              <a:t>Malware may detect attempts to disable and then take actions based on that</a:t>
+            </a:r>
+          </a:p>
+          <a:p>
+            <a:endParaRPr lang="en-AU" b="1" dirty="0">
+              <a:effectLst/>
+            </a:endParaRPr>
+          </a:p>
+          <a:p>
+            <a:endParaRPr lang="en-AU" b="1" dirty="0"/>
+          </a:p>
+          <a:p>
+            <a:endParaRPr lang="en-US" dirty="0"/>
+          </a:p>
+          <a:p>
+            <a:pPr marL="36900" indent="0">
+              <a:buNone/>
+            </a:pPr>
+            <a:endParaRPr lang="en-AU" dirty="0">
+              <a:effectLst/>
+            </a:endParaRPr>
+          </a:p>
+          <a:p>
+            <a:endParaRPr lang="en-AU" sz="2000" dirty="0"/>
+          </a:p>
+        </p:txBody>
+      </p:sp>
+    </p:spTree>
+    <p:extLst>
+      <p:ext uri="{BB962C8B-B14F-4D97-AF65-F5344CB8AC3E}">
+        <p14:creationId xmlns:p14="http://schemas.microsoft.com/office/powerpoint/2010/main" val="971809676"/>
+      </p:ext>
+    </p:extLst>
+  </p:cSld>
+  <p:clrMapOvr>
+    <a:masterClrMapping/>
+  </p:clrMapOvr>
+</p:sld>
+</file>
+
+<file path=ppt/slides/slide18.xml><?xml version="1.0" encoding="utf-8"?>
+<p:sld xmlns:a="http://schemas.openxmlformats.org/drawingml/2006/main" xmlns:r="http://schemas.openxmlformats.org/officeDocument/2006/relationships" xmlns:p="http://schemas.openxmlformats.org/presentationml/2006/main">
+  <p:cSld>
+    <p:spTree>
+      <p:nvGrpSpPr>
+        <p:cNvPr id="1" name=""/>
+        <p:cNvGrpSpPr/>
+        <p:nvPr/>
+      </p:nvGrpSpPr>
+      <p:grpSpPr>
+        <a:xfrm>
+          <a:off x="0" y="0"/>
+          <a:ext cx="0" cy="0"/>
+          <a:chOff x="0" y="0"/>
+          <a:chExt cx="0" cy="0"/>
+        </a:xfrm>
+      </p:grpSpPr>
+      <p:sp>
+        <p:nvSpPr>
+          <p:cNvPr id="2" name="Title 1">
+            <a:extLst>
+              <a:ext uri="{FF2B5EF4-FFF2-40B4-BE49-F238E27FC236}">
+                <a16:creationId xmlns:a16="http://schemas.microsoft.com/office/drawing/2014/main" id="{07F6FF8C-A74B-E640-AF2F-9B4E07A213CF}"/>
+              </a:ext>
+            </a:extLst>
+          </p:cNvPr>
+          <p:cNvSpPr>
+            <a:spLocks noGrp="1"/>
+          </p:cNvSpPr>
+          <p:nvPr>
+            <p:ph type="title"/>
+          </p:nvPr>
+        </p:nvSpPr>
+        <p:spPr/>
+        <p:txBody>
+          <a:bodyPr/>
+          <a:lstStyle/>
+          <a:p>
+            <a:r>
+              <a:rPr lang="en-AU" dirty="0"/>
+              <a:t>Incident Containment Eradication &amp; Recovery</a:t>
+            </a:r>
+          </a:p>
+        </p:txBody>
+      </p:sp>
+      <p:sp>
+        <p:nvSpPr>
+          <p:cNvPr id="3" name="Content Placeholder 2">
+            <a:extLst>
+              <a:ext uri="{FF2B5EF4-FFF2-40B4-BE49-F238E27FC236}">
+                <a16:creationId xmlns:a16="http://schemas.microsoft.com/office/drawing/2014/main" id="{C29FA815-F1A1-E848-8BE0-A481039CE411}"/>
+              </a:ext>
+            </a:extLst>
+          </p:cNvPr>
+          <p:cNvSpPr>
+            <a:spLocks noGrp="1"/>
+          </p:cNvSpPr>
+          <p:nvPr>
+            <p:ph idx="1"/>
+          </p:nvPr>
+        </p:nvSpPr>
+        <p:spPr>
+          <a:xfrm>
+            <a:off x="913795" y="2076450"/>
+            <a:ext cx="10353762" cy="4171950"/>
+          </a:xfrm>
+        </p:spPr>
+        <p:txBody>
+          <a:bodyPr>
+            <a:normAutofit/>
+          </a:bodyPr>
+          <a:lstStyle/>
+          <a:p>
+            <a:r>
+              <a:rPr lang="en-AU" b="1" dirty="0">
+                <a:effectLst/>
+              </a:rPr>
+              <a:t>Eradication and recovery may involve rebuilding computers or recovering from backups</a:t>
+            </a:r>
+          </a:p>
+          <a:p>
+            <a:r>
+              <a:rPr lang="en-AU" b="1" dirty="0">
+                <a:effectLst/>
+              </a:rPr>
+              <a:t>Must ensure that all malware is removed</a:t>
+            </a:r>
+          </a:p>
+          <a:p>
+            <a:r>
+              <a:rPr lang="en-AU" b="1" dirty="0">
+                <a:effectLst/>
+              </a:rPr>
+              <a:t>Update accounts</a:t>
+            </a:r>
+          </a:p>
+          <a:p>
+            <a:endParaRPr lang="en-AU" dirty="0">
+              <a:effectLst/>
+            </a:endParaRPr>
+          </a:p>
+          <a:p>
+            <a:endParaRPr lang="en-AU" dirty="0"/>
+          </a:p>
+          <a:p>
+            <a:endParaRPr lang="en-US" dirty="0"/>
+          </a:p>
+          <a:p>
+            <a:pPr marL="36900" indent="0">
+              <a:buNone/>
+            </a:pPr>
+            <a:endParaRPr lang="en-AU" dirty="0">
+              <a:effectLst/>
+            </a:endParaRPr>
+          </a:p>
+          <a:p>
+            <a:endParaRPr lang="en-AU" sz="2000" dirty="0"/>
+          </a:p>
+        </p:txBody>
+      </p:sp>
+    </p:spTree>
+    <p:extLst>
+      <p:ext uri="{BB962C8B-B14F-4D97-AF65-F5344CB8AC3E}">
+        <p14:creationId xmlns:p14="http://schemas.microsoft.com/office/powerpoint/2010/main" val="3196436922"/>
+      </p:ext>
+    </p:extLst>
+  </p:cSld>
+  <p:clrMapOvr>
+    <a:masterClrMapping/>
+  </p:clrMapOvr>
+</p:sld>
+</file>
+
+<file path=ppt/slides/slide19.xml><?xml version="1.0" encoding="utf-8"?>
+<p:sld xmlns:a="http://schemas.openxmlformats.org/drawingml/2006/main" xmlns:r="http://schemas.openxmlformats.org/officeDocument/2006/relationships" xmlns:p="http://schemas.openxmlformats.org/presentationml/2006/main">
+  <p:cSld>
+    <p:spTree>
+      <p:nvGrpSpPr>
+        <p:cNvPr id="1" name=""/>
+        <p:cNvGrpSpPr/>
+        <p:nvPr/>
+      </p:nvGrpSpPr>
+      <p:grpSpPr>
+        <a:xfrm>
+          <a:off x="0" y="0"/>
+          <a:ext cx="0" cy="0"/>
+          <a:chOff x="0" y="0"/>
+          <a:chExt cx="0" cy="0"/>
+        </a:xfrm>
+      </p:grpSpPr>
+      <p:sp>
+        <p:nvSpPr>
+          <p:cNvPr id="2" name="Title 1">
+            <a:extLst>
+              <a:ext uri="{FF2B5EF4-FFF2-40B4-BE49-F238E27FC236}">
+                <a16:creationId xmlns:a16="http://schemas.microsoft.com/office/drawing/2014/main" id="{07F6FF8C-A74B-E640-AF2F-9B4E07A213CF}"/>
+              </a:ext>
+            </a:extLst>
+          </p:cNvPr>
+          <p:cNvSpPr>
+            <a:spLocks noGrp="1"/>
+          </p:cNvSpPr>
+          <p:nvPr>
+            <p:ph type="title"/>
+          </p:nvPr>
+        </p:nvSpPr>
+        <p:spPr/>
+        <p:txBody>
+          <a:bodyPr/>
+          <a:lstStyle/>
+          <a:p>
+            <a:r>
+              <a:rPr lang="en-AU" dirty="0"/>
+              <a:t>Incident Post-Incident Activity</a:t>
+            </a:r>
+          </a:p>
+        </p:txBody>
+      </p:sp>
+      <p:sp>
+        <p:nvSpPr>
+          <p:cNvPr id="3" name="Content Placeholder 2">
+            <a:extLst>
+              <a:ext uri="{FF2B5EF4-FFF2-40B4-BE49-F238E27FC236}">
+                <a16:creationId xmlns:a16="http://schemas.microsoft.com/office/drawing/2014/main" id="{C29FA815-F1A1-E848-8BE0-A481039CE411}"/>
+              </a:ext>
+            </a:extLst>
+          </p:cNvPr>
+          <p:cNvSpPr>
+            <a:spLocks noGrp="1"/>
+          </p:cNvSpPr>
+          <p:nvPr>
+            <p:ph idx="1"/>
+          </p:nvPr>
+        </p:nvSpPr>
+        <p:spPr>
+          <a:xfrm>
+            <a:off x="913795" y="2076450"/>
+            <a:ext cx="10353762" cy="4171950"/>
+          </a:xfrm>
+        </p:spPr>
+        <p:txBody>
+          <a:bodyPr>
+            <a:normAutofit/>
+          </a:bodyPr>
+          <a:lstStyle/>
+          <a:p>
+            <a:r>
+              <a:rPr lang="en-AU" b="1" dirty="0">
+                <a:effectLst/>
+              </a:rPr>
+              <a:t>Lessons learned</a:t>
+            </a:r>
+          </a:p>
+          <a:p>
+            <a:r>
+              <a:rPr lang="en-AU" b="1" dirty="0">
+                <a:effectLst/>
+              </a:rPr>
+              <a:t>Breach notification to appropriate authorities</a:t>
+            </a:r>
+          </a:p>
+          <a:p>
+            <a:r>
+              <a:rPr lang="en-AU" b="1" dirty="0">
+                <a:effectLst/>
+              </a:rPr>
+              <a:t>Notification of affected users and follow-up</a:t>
+            </a:r>
+          </a:p>
+          <a:p>
+            <a:r>
+              <a:rPr lang="en-AU" b="1" dirty="0">
+                <a:effectLst/>
+              </a:rPr>
+              <a:t>Reputation management</a:t>
+            </a:r>
+          </a:p>
+          <a:p>
+            <a:r>
+              <a:rPr lang="en-AU" b="1" dirty="0">
+                <a:effectLst/>
+              </a:rPr>
+              <a:t>Insurance claims</a:t>
+            </a:r>
+          </a:p>
+          <a:p>
+            <a:r>
+              <a:rPr lang="en-AU" b="1" dirty="0">
+                <a:effectLst/>
+              </a:rPr>
+              <a:t>Analysis of incident data</a:t>
+            </a:r>
+          </a:p>
+          <a:p>
+            <a:endParaRPr lang="en-AU" dirty="0">
+              <a:effectLst/>
+            </a:endParaRPr>
+          </a:p>
+          <a:p>
+            <a:endParaRPr lang="en-AU" dirty="0">
+              <a:effectLst/>
+            </a:endParaRPr>
+          </a:p>
+          <a:p>
+            <a:endParaRPr lang="en-AU" dirty="0">
+              <a:effectLst/>
+            </a:endParaRPr>
+          </a:p>
+          <a:p>
+            <a:endParaRPr lang="en-AU" dirty="0"/>
+          </a:p>
+          <a:p>
+            <a:endParaRPr lang="en-US" dirty="0"/>
+          </a:p>
+          <a:p>
+            <a:pPr marL="36900" indent="0">
+              <a:buNone/>
+            </a:pPr>
+            <a:endParaRPr lang="en-AU" dirty="0">
+              <a:effectLst/>
+            </a:endParaRPr>
+          </a:p>
+          <a:p>
+            <a:endParaRPr lang="en-AU" sz="2000" dirty="0"/>
+          </a:p>
+        </p:txBody>
+      </p:sp>
+    </p:spTree>
+    <p:extLst>
+      <p:ext uri="{BB962C8B-B14F-4D97-AF65-F5344CB8AC3E}">
+        <p14:creationId xmlns:p14="http://schemas.microsoft.com/office/powerpoint/2010/main" val="860627114"/>
+      </p:ext>
+    </p:extLst>
+  </p:cSld>
+  <p:clrMapOvr>
+    <a:masterClrMapping/>
+  </p:clrMapOvr>
+</p:sld>
+</file>
+
+<file path=ppt/slides/slide2.xml><?xml version="1.0" encoding="utf-8"?>
+<p:sld xmlns:a="http://schemas.openxmlformats.org/drawingml/2006/main" xmlns:r="http://schemas.openxmlformats.org/officeDocument/2006/relationships" xmlns:p="http://schemas.openxmlformats.org/presentationml/2006/main">
+  <p:cSld>
+    <p:bg>
+      <p:bgPr>
+        <a:blipFill rotWithShape="1">
+          <a:blip r:embed="rId3">
+            <a:duotone>
+              <a:schemeClr val="bg1">
+                <a:shade val="80000"/>
+                <a:lumMod val="80000"/>
+              </a:schemeClr>
+              <a:schemeClr val="bg1">
+                <a:tint val="98000"/>
+              </a:schemeClr>
+            </a:duotone>
+          </a:blip>
+          <a:stretch/>
+        </a:blipFill>
+        <a:effectLst/>
+      </p:bgPr>
+    </p:bg>
+    <p:spTree>
+      <p:nvGrpSpPr>
+        <p:cNvPr id="1" name=""/>
+        <p:cNvGrpSpPr/>
+        <p:nvPr/>
+      </p:nvGrpSpPr>
+      <p:grpSpPr>
+        <a:xfrm>
+          <a:off x="0" y="0"/>
+          <a:ext cx="0" cy="0"/>
+          <a:chOff x="0" y="0"/>
+          <a:chExt cx="0" cy="0"/>
+        </a:xfrm>
+      </p:grpSpPr>
+      <p:sp>
+        <p:nvSpPr>
+          <p:cNvPr id="73" name="Rectangle 72">
+            <a:extLst>
+              <a:ext uri="{FF2B5EF4-FFF2-40B4-BE49-F238E27FC236}">
+                <a16:creationId xmlns:a16="http://schemas.microsoft.com/office/drawing/2014/main" id="{A98FD4FC-479A-4C2B-84A5-CF81E055FBC0}"/>
+              </a:ext>
+              <a:ext uri="{C183D7F6-B498-43B3-948B-1728B52AA6E4}">
+                <adec:decorative xmlns:adec="http://schemas.microsoft.com/office/drawing/2017/decorative" val="1"/>
+              </a:ext>
+            </a:extLst>
+          </p:cNvPr>
+          <p:cNvSpPr>
+            <a:spLocks noGrp="1" noRot="1" noChangeAspect="1" noMove="1" noResize="1" noEditPoints="1" noAdjustHandles="1" noChangeArrowheads="1" noChangeShapeType="1" noTextEdit="1"/>
+          </p:cNvSpPr>
+          <p:nvPr>
+            <p:extLst>
+              <p:ext uri="{386F3935-93C4-4BCD-93E2-E3B085C9AB24}">
+                <p16:designElem xmlns:p16="http://schemas.microsoft.com/office/powerpoint/2015/main" val="1"/>
+              </p:ext>
+            </p:extLst>
+          </p:nvPr>
+        </p:nvSpPr>
+        <p:spPr>
+          <a:xfrm>
+            <a:off x="0" y="0"/>
+            <a:ext cx="12192000" cy="6858000"/>
+          </a:xfrm>
+          <a:prstGeom prst="rect">
+            <a:avLst/>
+          </a:prstGeom>
+          <a:solidFill>
+            <a:srgbClr val="FFFFFF"/>
+          </a:solidFill>
+          <a:ln>
+            <a:noFill/>
+          </a:ln>
+        </p:spPr>
+        <p:style>
+          <a:lnRef idx="2">
+            <a:schemeClr val="accent1">
+              <a:shade val="50000"/>
+            </a:schemeClr>
+          </a:lnRef>
+          <a:fillRef idx="1">
+            <a:schemeClr val="accent1"/>
+          </a:fillRef>
+          <a:effectRef idx="0">
+            <a:schemeClr val="accent1"/>
+          </a:effectRef>
+          <a:fontRef idx="minor">
+            <a:schemeClr val="lt1"/>
+          </a:fontRef>
+        </p:style>
+        <p:txBody>
+          <a:bodyPr rtlCol="0" anchor="ctr"/>
+          <a:lstStyle/>
+          <a:p>
+            <a:pPr algn="ctr"/>
+            <a:endParaRPr lang="en-US"/>
+          </a:p>
+        </p:txBody>
+      </p:sp>
+      <p:sp useBgFill="1">
+        <p:nvSpPr>
+          <p:cNvPr id="75" name="Freeform 5">
             <a:extLst>
               <a:ext uri="{FF2B5EF4-FFF2-40B4-BE49-F238E27FC236}">
                 <a16:creationId xmlns:a16="http://schemas.microsoft.com/office/drawing/2014/main" id="{37D54B6C-87D0-4C03-8335-3955179D2B5B}"/>
@@ -14775,7 +15933,7 @@
           <p:cNvPr id="2" name="Title 1">
             <a:extLst>
               <a:ext uri="{FF2B5EF4-FFF2-40B4-BE49-F238E27FC236}">
-                <a16:creationId xmlns:a16="http://schemas.microsoft.com/office/drawing/2014/main" id="{07F6FF8C-A74B-E640-AF2F-9B4E07A213CF}"/>
+                <a16:creationId xmlns:a16="http://schemas.microsoft.com/office/drawing/2014/main" id="{5C4F01C5-5333-2248-B03B-703C97F7CC69}"/>
               </a:ext>
             </a:extLst>
           </p:cNvPr>
@@ -14793,107 +15951,166 @@
           </a:xfrm>
         </p:spPr>
         <p:txBody>
-          <a:bodyPr anchor="b">
+          <a:bodyPr vert="horz" lIns="91440" tIns="45720" rIns="91440" bIns="45720" rtlCol="0" anchor="b">
             <a:normAutofit/>
           </a:bodyPr>
           <a:lstStyle/>
           <a:p>
             <a:pPr algn="l"/>
             <a:r>
-              <a:rPr lang="en-AU" sz="2400"/>
-              <a:t>Pyramid of Pain</a:t>
-            </a:r>
-          </a:p>
-        </p:txBody>
-      </p:sp>
-      <p:sp>
-        <p:nvSpPr>
-          <p:cNvPr id="3" name="Content Placeholder 2">
+              <a:rPr lang="en-US" sz="2400" kern="1200" dirty="0">
+                <a:ln>
+                  <a:solidFill>
+                    <a:schemeClr val="bg1">
+                      <a:lumMod val="75000"/>
+                      <a:lumOff val="25000"/>
+                      <a:alpha val="10000"/>
+                    </a:schemeClr>
+                  </a:solidFill>
+                </a:ln>
+                <a:solidFill>
+                  <a:schemeClr val="tx2"/>
+                </a:solidFill>
+                <a:effectLst>
+                  <a:outerShdw blurRad="9525" dist="25400" dir="14640000" algn="tl" rotWithShape="0">
+                    <a:schemeClr val="bg1">
+                      <a:alpha val="30000"/>
+                    </a:schemeClr>
+                  </a:outerShdw>
+                </a:effectLst>
+                <a:latin typeface="+mj-lt"/>
+                <a:ea typeface="+mj-ea"/>
+                <a:cs typeface="Trebuchet MS"/>
+              </a:rPr>
+              <a:t>A unit about </a:t>
+            </a:r>
+            <a:r>
+              <a:rPr lang="en-US" sz="2400" strike="sngStrike" kern="1200" dirty="0">
+                <a:ln>
+                  <a:solidFill>
+                    <a:schemeClr val="bg1">
+                      <a:lumMod val="75000"/>
+                      <a:lumOff val="25000"/>
+                      <a:alpha val="10000"/>
+                    </a:schemeClr>
+                  </a:solidFill>
+                </a:ln>
+                <a:solidFill>
+                  <a:schemeClr val="tx2"/>
+                </a:solidFill>
+                <a:effectLst>
+                  <a:outerShdw blurRad="9525" dist="25400" dir="14640000" algn="tl" rotWithShape="0">
+                    <a:schemeClr val="bg1">
+                      <a:alpha val="30000"/>
+                    </a:schemeClr>
+                  </a:outerShdw>
+                </a:effectLst>
+                <a:latin typeface="+mj-lt"/>
+                <a:ea typeface="+mj-ea"/>
+                <a:cs typeface="Trebuchet MS"/>
+              </a:rPr>
+              <a:t>cats</a:t>
+            </a:r>
+            <a:r>
+              <a:rPr lang="en-US" sz="2400" kern="1200" dirty="0">
+                <a:ln>
+                  <a:solidFill>
+                    <a:schemeClr val="bg1">
+                      <a:lumMod val="75000"/>
+                      <a:lumOff val="25000"/>
+                      <a:alpha val="10000"/>
+                    </a:schemeClr>
+                  </a:solidFill>
+                </a:ln>
+                <a:solidFill>
+                  <a:schemeClr val="tx2"/>
+                </a:solidFill>
+                <a:effectLst>
+                  <a:outerShdw blurRad="9525" dist="25400" dir="14640000" algn="tl" rotWithShape="0">
+                    <a:schemeClr val="bg1">
+                      <a:alpha val="30000"/>
+                    </a:schemeClr>
+                  </a:outerShdw>
+                </a:effectLst>
+                <a:latin typeface="+mj-lt"/>
+                <a:ea typeface="+mj-ea"/>
+                <a:cs typeface="Trebuchet MS"/>
+              </a:rPr>
+              <a:t> cybersecurity</a:t>
+            </a:r>
+          </a:p>
+        </p:txBody>
+      </p:sp>
+      <p:sp>
+        <p:nvSpPr>
+          <p:cNvPr id="3" name="TextBox 2">
             <a:extLst>
               <a:ext uri="{FF2B5EF4-FFF2-40B4-BE49-F238E27FC236}">
-                <a16:creationId xmlns:a16="http://schemas.microsoft.com/office/drawing/2014/main" id="{C29FA815-F1A1-E848-8BE0-A481039CE411}"/>
+                <a16:creationId xmlns:a16="http://schemas.microsoft.com/office/drawing/2014/main" id="{D04A9560-61A7-8541-B04F-4C1E6892BE66}"/>
               </a:ext>
             </a:extLst>
           </p:cNvPr>
-          <p:cNvSpPr>
-            <a:spLocks noGrp="1"/>
-          </p:cNvSpPr>
-          <p:nvPr>
-            <p:ph idx="1"/>
-          </p:nvPr>
+          <p:cNvSpPr txBox="1"/>
+          <p:nvPr/>
         </p:nvSpPr>
         <p:spPr>
           <a:xfrm>
             <a:off x="1039905" y="2147862"/>
             <a:ext cx="3405573" cy="3499563"/>
           </a:xfrm>
+          <a:prstGeom prst="rect">
+            <a:avLst/>
+          </a:prstGeom>
         </p:spPr>
         <p:txBody>
-          <a:bodyPr anchor="t">
+          <a:bodyPr vert="horz" lIns="91440" tIns="45720" rIns="91440" bIns="45720" rtlCol="0" anchor="t">
             <a:normAutofit/>
           </a:bodyPr>
           <a:lstStyle/>
           <a:p>
-            <a:r>
-              <a:rPr lang="en-AU" sz="1600" dirty="0">
-                <a:effectLst/>
-              </a:rPr>
-              <a:t>David J Bianco developed this idea in 2013</a:t>
-            </a:r>
-          </a:p>
-          <a:p>
-            <a:r>
-              <a:rPr lang="en-AU" sz="1600" dirty="0">
-                <a:effectLst/>
-              </a:rPr>
-              <a:t>TTPs sit at the top of the </a:t>
-            </a:r>
-            <a:r>
-              <a:rPr lang="en-AU" sz="1600" dirty="0" err="1">
-                <a:effectLst/>
-              </a:rPr>
-              <a:t>IoCs</a:t>
-            </a:r>
-            <a:r>
-              <a:rPr lang="en-AU" sz="1600" dirty="0">
-                <a:effectLst/>
-              </a:rPr>
-              <a:t> and are thought to be the hardest thing to change because of the time, money and effort that goes into developing skills and infrastructure </a:t>
-            </a:r>
-          </a:p>
-          <a:p>
-            <a:r>
-              <a:rPr lang="en-AU" sz="1600" dirty="0">
-                <a:effectLst/>
-              </a:rPr>
-              <a:t>Because of this they are thought to be a marker of a threat actor group</a:t>
-            </a:r>
-          </a:p>
-          <a:p>
-            <a:endParaRPr lang="en-AU" sz="1600" dirty="0"/>
-          </a:p>
-          <a:p>
-            <a:endParaRPr lang="en-US" sz="1600" dirty="0"/>
-          </a:p>
-          <a:p>
-            <a:pPr marL="36900" indent="0">
-              <a:buNone/>
+            <a:pPr defTabSz="457200">
+              <a:spcBef>
+                <a:spcPct val="20000"/>
+              </a:spcBef>
+              <a:spcAft>
+                <a:spcPts val="600"/>
+              </a:spcAft>
+              <a:buClr>
+                <a:schemeClr val="tx2"/>
+              </a:buClr>
+              <a:buSzPct val="70000"/>
+              <a:buFont typeface="Wingdings 2" charset="2"/>
             </a:pPr>
-            <a:endParaRPr lang="en-AU" sz="1600" dirty="0">
-              <a:effectLst/>
+            <a:endParaRPr lang="en-US" sz="1600" dirty="0">
+              <a:ln>
+                <a:solidFill>
+                  <a:schemeClr val="bg1">
+                    <a:lumMod val="75000"/>
+                    <a:lumOff val="25000"/>
+                    <a:alpha val="10000"/>
+                  </a:schemeClr>
+                </a:solidFill>
+              </a:ln>
+              <a:solidFill>
+                <a:schemeClr val="tx2"/>
+              </a:solidFill>
+              <a:effectLst>
+                <a:outerShdw blurRad="9525" dist="25400" dir="14640000" algn="tl" rotWithShape="0">
+                  <a:schemeClr val="bg1">
+                    <a:alpha val="30000"/>
+                  </a:schemeClr>
+                </a:outerShdw>
+              </a:effectLst>
             </a:endParaRPr>
-          </a:p>
-          <a:p>
-            <a:endParaRPr lang="en-AU" sz="1600" dirty="0"/>
           </a:p>
         </p:txBody>
       </p:sp>
       <p:pic>
         <p:nvPicPr>
-          <p:cNvPr id="1026" name="Picture 2">
+          <p:cNvPr id="2050" name="Picture 2" descr="Last week's Binance hack highlighted two glaring issues in cybersecurity  and the integrity of the Bitcoin network.The cr… | Funny cat memes, Bad cats,  Funny animals">
             <a:extLst>
               <a:ext uri="{FF2B5EF4-FFF2-40B4-BE49-F238E27FC236}">
-                <a16:creationId xmlns:a16="http://schemas.microsoft.com/office/drawing/2014/main" id="{020FACBB-D6CA-EE46-BA7D-125E962B7793}"/>
+                <a16:creationId xmlns:a16="http://schemas.microsoft.com/office/drawing/2014/main" id="{82EDB343-FF32-4D47-839B-0C9272A07A4D}"/>
               </a:ext>
             </a:extLst>
           </p:cNvPr>
@@ -14910,14 +16127,15 @@
               </a:ext>
             </a:extLst>
           </a:blip>
+          <a:srcRect/>
           <a:stretch>
             <a:fillRect/>
           </a:stretch>
         </p:blipFill>
         <p:spPr bwMode="auto">
           <a:xfrm>
-            <a:off x="5387351" y="1433076"/>
-            <a:ext cx="6161183" cy="4001593"/>
+            <a:off x="6096000" y="819569"/>
+            <a:ext cx="5227319" cy="5218862"/>
           </a:xfrm>
           <a:prstGeom prst="rect">
             <a:avLst/>
@@ -14934,10 +16152,53 @@
           </a:extLst>
         </p:spPr>
       </p:pic>
+      <p:sp>
+        <p:nvSpPr>
+          <p:cNvPr id="7" name="TextBox 6">
+            <a:extLst>
+              <a:ext uri="{FF2B5EF4-FFF2-40B4-BE49-F238E27FC236}">
+                <a16:creationId xmlns:a16="http://schemas.microsoft.com/office/drawing/2014/main" id="{DCE4D174-E44F-CF4F-AA1C-D2B815E60ABC}"/>
+              </a:ext>
+            </a:extLst>
+          </p:cNvPr>
+          <p:cNvSpPr txBox="1"/>
+          <p:nvPr/>
+        </p:nvSpPr>
+        <p:spPr>
+          <a:xfrm>
+            <a:off x="1079331" y="2128644"/>
+            <a:ext cx="2893741" cy="246221"/>
+          </a:xfrm>
+          <a:prstGeom prst="rect">
+            <a:avLst/>
+          </a:prstGeom>
+          <a:noFill/>
+        </p:spPr>
+        <p:txBody>
+          <a:bodyPr wrap="none" rtlCol="0">
+            <a:spAutoFit/>
+          </a:bodyPr>
+          <a:lstStyle/>
+          <a:p>
+            <a:r>
+              <a:rPr lang="en-AU" sz="1000" dirty="0"/>
+              <a:t>https://</a:t>
+            </a:r>
+            <a:r>
+              <a:rPr lang="en-AU" sz="1000" dirty="0" err="1"/>
+              <a:t>depositphotos.com</a:t>
+            </a:r>
+            <a:r>
+              <a:rPr lang="en-AU" sz="1000" dirty="0"/>
+              <a:t>/portfolio-7863750.html</a:t>
+            </a:r>
+          </a:p>
+        </p:txBody>
+      </p:sp>
     </p:spTree>
     <p:extLst>
       <p:ext uri="{BB962C8B-B14F-4D97-AF65-F5344CB8AC3E}">
-        <p14:creationId xmlns:p14="http://schemas.microsoft.com/office/powerpoint/2010/main" val="3599752435"/>
+        <p14:creationId xmlns:p14="http://schemas.microsoft.com/office/powerpoint/2010/main" val="2972598590"/>
       </p:ext>
     </p:extLst>
   </p:cSld>
@@ -14947,684 +16208,7 @@
 </p:sld>
 </file>
 
-<file path=ppt/slides/slide16.xml><?xml version="1.0" encoding="utf-8"?>
-<p:sld xmlns:a="http://schemas.openxmlformats.org/drawingml/2006/main" xmlns:r="http://schemas.openxmlformats.org/officeDocument/2006/relationships" xmlns:p="http://schemas.openxmlformats.org/presentationml/2006/main">
-  <p:cSld>
-    <p:spTree>
-      <p:nvGrpSpPr>
-        <p:cNvPr id="1" name=""/>
-        <p:cNvGrpSpPr/>
-        <p:nvPr/>
-      </p:nvGrpSpPr>
-      <p:grpSpPr>
-        <a:xfrm>
-          <a:off x="0" y="0"/>
-          <a:ext cx="0" cy="0"/>
-          <a:chOff x="0" y="0"/>
-          <a:chExt cx="0" cy="0"/>
-        </a:xfrm>
-      </p:grpSpPr>
-      <p:sp>
-        <p:nvSpPr>
-          <p:cNvPr id="2" name="Title 1">
-            <a:extLst>
-              <a:ext uri="{FF2B5EF4-FFF2-40B4-BE49-F238E27FC236}">
-                <a16:creationId xmlns:a16="http://schemas.microsoft.com/office/drawing/2014/main" id="{07F6FF8C-A74B-E640-AF2F-9B4E07A213CF}"/>
-              </a:ext>
-            </a:extLst>
-          </p:cNvPr>
-          <p:cNvSpPr>
-            <a:spLocks noGrp="1"/>
-          </p:cNvSpPr>
-          <p:nvPr>
-            <p:ph type="title"/>
-          </p:nvPr>
-        </p:nvSpPr>
-        <p:spPr/>
-        <p:txBody>
-          <a:bodyPr/>
-          <a:lstStyle/>
-          <a:p>
-            <a:r>
-              <a:rPr lang="en-AU" dirty="0"/>
-              <a:t>Attribution</a:t>
-            </a:r>
-          </a:p>
-        </p:txBody>
-      </p:sp>
-      <p:sp>
-        <p:nvSpPr>
-          <p:cNvPr id="3" name="Content Placeholder 2">
-            <a:extLst>
-              <a:ext uri="{FF2B5EF4-FFF2-40B4-BE49-F238E27FC236}">
-                <a16:creationId xmlns:a16="http://schemas.microsoft.com/office/drawing/2014/main" id="{C29FA815-F1A1-E848-8BE0-A481039CE411}"/>
-              </a:ext>
-            </a:extLst>
-          </p:cNvPr>
-          <p:cNvSpPr>
-            <a:spLocks noGrp="1"/>
-          </p:cNvSpPr>
-          <p:nvPr>
-            <p:ph idx="1"/>
-          </p:nvPr>
-        </p:nvSpPr>
-        <p:spPr/>
-        <p:txBody>
-          <a:bodyPr>
-            <a:normAutofit fontScale="92500"/>
-          </a:bodyPr>
-          <a:lstStyle/>
-          <a:p>
-            <a:r>
-              <a:rPr lang="en-AU" dirty="0">
-                <a:effectLst/>
-              </a:rPr>
-              <a:t>Attribution to a particular threat actor group is supposed to help because:</a:t>
-            </a:r>
-          </a:p>
-          <a:p>
-            <a:pPr lvl="1"/>
-            <a:r>
-              <a:rPr lang="en-AU" dirty="0">
-                <a:effectLst/>
-              </a:rPr>
-              <a:t>It reveals motivations and objectives of the attackers and so can potentially help in stopping progression of an attack</a:t>
-            </a:r>
-          </a:p>
-          <a:p>
-            <a:pPr lvl="1"/>
-            <a:r>
-              <a:rPr lang="en-AU" dirty="0">
-                <a:effectLst/>
-              </a:rPr>
-              <a:t>Helps understand the impact of the attack e.g. crime vs espionage</a:t>
-            </a:r>
-          </a:p>
-          <a:p>
-            <a:r>
-              <a:rPr lang="en-AU" dirty="0">
-                <a:effectLst/>
-              </a:rPr>
-              <a:t>MITRE ATT&amp;CK framework is based entirely on this premise. Contains information about 110 different groups and hundreds of TTPs</a:t>
-            </a:r>
-          </a:p>
-          <a:p>
-            <a:r>
-              <a:rPr lang="en-AU" dirty="0">
-                <a:effectLst/>
-              </a:rPr>
-              <a:t>Problems with this when you look at the actual distribution and uniqueness of the TTPs however</a:t>
-            </a:r>
-          </a:p>
-          <a:p>
-            <a:r>
-              <a:rPr lang="en-AU" dirty="0">
-                <a:effectLst/>
-              </a:rPr>
-              <a:t>Attribution is a very difficult topic as it is so open to False Flags and geopolitical posturing</a:t>
-            </a:r>
-          </a:p>
-          <a:p>
-            <a:endParaRPr lang="en-AU" dirty="0">
-              <a:effectLst/>
-            </a:endParaRPr>
-          </a:p>
-          <a:p>
-            <a:endParaRPr lang="en-AU" dirty="0"/>
-          </a:p>
-          <a:p>
-            <a:endParaRPr lang="en-US" dirty="0"/>
-          </a:p>
-          <a:p>
-            <a:pPr marL="36900" indent="0">
-              <a:buNone/>
-            </a:pPr>
-            <a:endParaRPr lang="en-AU" dirty="0">
-              <a:effectLst/>
-            </a:endParaRPr>
-          </a:p>
-          <a:p>
-            <a:endParaRPr lang="en-AU" sz="2000" dirty="0"/>
-          </a:p>
-        </p:txBody>
-      </p:sp>
-    </p:spTree>
-    <p:extLst>
-      <p:ext uri="{BB962C8B-B14F-4D97-AF65-F5344CB8AC3E}">
-        <p14:creationId xmlns:p14="http://schemas.microsoft.com/office/powerpoint/2010/main" val="1948589966"/>
-      </p:ext>
-    </p:extLst>
-  </p:cSld>
-  <p:clrMapOvr>
-    <a:masterClrMapping/>
-  </p:clrMapOvr>
-</p:sld>
-</file>
-
-<file path=ppt/slides/slide17.xml><?xml version="1.0" encoding="utf-8"?>
-<p:sld xmlns:a="http://schemas.openxmlformats.org/drawingml/2006/main" xmlns:r="http://schemas.openxmlformats.org/officeDocument/2006/relationships" xmlns:p="http://schemas.openxmlformats.org/presentationml/2006/main">
-  <p:cSld>
-    <p:spTree>
-      <p:nvGrpSpPr>
-        <p:cNvPr id="1" name=""/>
-        <p:cNvGrpSpPr/>
-        <p:nvPr/>
-      </p:nvGrpSpPr>
-      <p:grpSpPr>
-        <a:xfrm>
-          <a:off x="0" y="0"/>
-          <a:ext cx="0" cy="0"/>
-          <a:chOff x="0" y="0"/>
-          <a:chExt cx="0" cy="0"/>
-        </a:xfrm>
-      </p:grpSpPr>
-      <p:sp>
-        <p:nvSpPr>
-          <p:cNvPr id="2" name="Title 1">
-            <a:extLst>
-              <a:ext uri="{FF2B5EF4-FFF2-40B4-BE49-F238E27FC236}">
-                <a16:creationId xmlns:a16="http://schemas.microsoft.com/office/drawing/2014/main" id="{07F6FF8C-A74B-E640-AF2F-9B4E07A213CF}"/>
-              </a:ext>
-            </a:extLst>
-          </p:cNvPr>
-          <p:cNvSpPr>
-            <a:spLocks noGrp="1"/>
-          </p:cNvSpPr>
-          <p:nvPr>
-            <p:ph type="title"/>
-          </p:nvPr>
-        </p:nvSpPr>
-        <p:spPr/>
-        <p:txBody>
-          <a:bodyPr/>
-          <a:lstStyle/>
-          <a:p>
-            <a:r>
-              <a:rPr lang="en-AU" dirty="0"/>
-              <a:t>Incident Containment Eradication &amp; Recovery</a:t>
-            </a:r>
-          </a:p>
-        </p:txBody>
-      </p:sp>
-      <p:sp>
-        <p:nvSpPr>
-          <p:cNvPr id="3" name="Content Placeholder 2">
-            <a:extLst>
-              <a:ext uri="{FF2B5EF4-FFF2-40B4-BE49-F238E27FC236}">
-                <a16:creationId xmlns:a16="http://schemas.microsoft.com/office/drawing/2014/main" id="{C29FA815-F1A1-E848-8BE0-A481039CE411}"/>
-              </a:ext>
-            </a:extLst>
-          </p:cNvPr>
-          <p:cNvSpPr>
-            <a:spLocks noGrp="1"/>
-          </p:cNvSpPr>
-          <p:nvPr>
-            <p:ph idx="1"/>
-          </p:nvPr>
-        </p:nvSpPr>
-        <p:spPr>
-          <a:xfrm>
-            <a:off x="913795" y="2076450"/>
-            <a:ext cx="10353762" cy="4171950"/>
-          </a:xfrm>
-        </p:spPr>
-        <p:txBody>
-          <a:bodyPr>
-            <a:normAutofit fontScale="77500" lnSpcReduction="20000"/>
-          </a:bodyPr>
-          <a:lstStyle/>
-          <a:p>
-            <a:r>
-              <a:rPr lang="en-AU" dirty="0">
-                <a:effectLst/>
-              </a:rPr>
-              <a:t>The first challenge is containment to stop further impact. This may involve:</a:t>
-            </a:r>
-          </a:p>
-          <a:p>
-            <a:pPr lvl="1"/>
-            <a:r>
-              <a:rPr lang="en-AU" dirty="0">
-                <a:effectLst/>
-              </a:rPr>
-              <a:t>Disabling accounts</a:t>
-            </a:r>
-          </a:p>
-          <a:p>
-            <a:pPr lvl="1"/>
-            <a:r>
-              <a:rPr lang="en-AU" dirty="0">
-                <a:effectLst/>
-              </a:rPr>
-              <a:t>Blocking network traffic </a:t>
-            </a:r>
-          </a:p>
-          <a:p>
-            <a:pPr lvl="1"/>
-            <a:r>
-              <a:rPr lang="en-AU" dirty="0">
-                <a:effectLst/>
-              </a:rPr>
-              <a:t>Isolating a computer or segment of the network</a:t>
-            </a:r>
-          </a:p>
-          <a:p>
-            <a:r>
-              <a:rPr lang="en-AU" dirty="0">
-                <a:effectLst/>
-              </a:rPr>
-              <a:t>Balance the strategy against:</a:t>
-            </a:r>
-          </a:p>
-          <a:p>
-            <a:pPr lvl="1"/>
-            <a:r>
-              <a:rPr lang="en-AU" dirty="0">
-                <a:effectLst/>
-              </a:rPr>
-              <a:t>Potential damage to and theft of resources</a:t>
-            </a:r>
-          </a:p>
-          <a:p>
-            <a:pPr lvl="1"/>
-            <a:r>
-              <a:rPr lang="en-AU" dirty="0">
-                <a:effectLst/>
-              </a:rPr>
-              <a:t>Need for evidence preservation</a:t>
-            </a:r>
-          </a:p>
-          <a:p>
-            <a:pPr lvl="1"/>
-            <a:r>
-              <a:rPr lang="en-AU" dirty="0">
-                <a:effectLst/>
-              </a:rPr>
-              <a:t>Service availability</a:t>
-            </a:r>
-          </a:p>
-          <a:p>
-            <a:pPr lvl="1"/>
-            <a:r>
-              <a:rPr lang="en-AU" dirty="0">
-                <a:effectLst/>
-              </a:rPr>
-              <a:t>Time and resources needed</a:t>
-            </a:r>
-          </a:p>
-          <a:p>
-            <a:pPr lvl="1"/>
-            <a:r>
-              <a:rPr lang="en-AU" dirty="0">
-                <a:effectLst/>
-              </a:rPr>
-              <a:t>Effectiveness of the strategy</a:t>
-            </a:r>
-          </a:p>
-          <a:p>
-            <a:pPr lvl="1"/>
-            <a:r>
-              <a:rPr lang="en-AU" dirty="0">
-                <a:effectLst/>
-              </a:rPr>
-              <a:t>Duration</a:t>
-            </a:r>
-          </a:p>
-          <a:p>
-            <a:pPr lvl="1"/>
-            <a:r>
-              <a:rPr lang="en-AU" dirty="0">
-                <a:effectLst/>
-              </a:rPr>
-              <a:t>Alerting the attackers</a:t>
-            </a:r>
-          </a:p>
-          <a:p>
-            <a:r>
-              <a:rPr lang="en-AU" dirty="0">
-                <a:effectLst/>
-              </a:rPr>
-              <a:t>Malware may detect attempts to disable and then take actions based on that</a:t>
-            </a:r>
-          </a:p>
-          <a:p>
-            <a:endParaRPr lang="en-AU" dirty="0">
-              <a:effectLst/>
-            </a:endParaRPr>
-          </a:p>
-          <a:p>
-            <a:endParaRPr lang="en-AU" dirty="0"/>
-          </a:p>
-          <a:p>
-            <a:endParaRPr lang="en-US" dirty="0"/>
-          </a:p>
-          <a:p>
-            <a:pPr marL="36900" indent="0">
-              <a:buNone/>
-            </a:pPr>
-            <a:endParaRPr lang="en-AU" dirty="0">
-              <a:effectLst/>
-            </a:endParaRPr>
-          </a:p>
-          <a:p>
-            <a:endParaRPr lang="en-AU" sz="2000" dirty="0"/>
-          </a:p>
-        </p:txBody>
-      </p:sp>
-    </p:spTree>
-    <p:extLst>
-      <p:ext uri="{BB962C8B-B14F-4D97-AF65-F5344CB8AC3E}">
-        <p14:creationId xmlns:p14="http://schemas.microsoft.com/office/powerpoint/2010/main" val="971809676"/>
-      </p:ext>
-    </p:extLst>
-  </p:cSld>
-  <p:clrMapOvr>
-    <a:masterClrMapping/>
-  </p:clrMapOvr>
-</p:sld>
-</file>
-
-<file path=ppt/slides/slide18.xml><?xml version="1.0" encoding="utf-8"?>
-<p:sld xmlns:a="http://schemas.openxmlformats.org/drawingml/2006/main" xmlns:r="http://schemas.openxmlformats.org/officeDocument/2006/relationships" xmlns:p="http://schemas.openxmlformats.org/presentationml/2006/main">
-  <p:cSld>
-    <p:spTree>
-      <p:nvGrpSpPr>
-        <p:cNvPr id="1" name=""/>
-        <p:cNvGrpSpPr/>
-        <p:nvPr/>
-      </p:nvGrpSpPr>
-      <p:grpSpPr>
-        <a:xfrm>
-          <a:off x="0" y="0"/>
-          <a:ext cx="0" cy="0"/>
-          <a:chOff x="0" y="0"/>
-          <a:chExt cx="0" cy="0"/>
-        </a:xfrm>
-      </p:grpSpPr>
-      <p:sp>
-        <p:nvSpPr>
-          <p:cNvPr id="2" name="Title 1">
-            <a:extLst>
-              <a:ext uri="{FF2B5EF4-FFF2-40B4-BE49-F238E27FC236}">
-                <a16:creationId xmlns:a16="http://schemas.microsoft.com/office/drawing/2014/main" id="{07F6FF8C-A74B-E640-AF2F-9B4E07A213CF}"/>
-              </a:ext>
-            </a:extLst>
-          </p:cNvPr>
-          <p:cNvSpPr>
-            <a:spLocks noGrp="1"/>
-          </p:cNvSpPr>
-          <p:nvPr>
-            <p:ph type="title"/>
-          </p:nvPr>
-        </p:nvSpPr>
-        <p:spPr/>
-        <p:txBody>
-          <a:bodyPr/>
-          <a:lstStyle/>
-          <a:p>
-            <a:r>
-              <a:rPr lang="en-AU" dirty="0"/>
-              <a:t>Incident Containment Eradication &amp; Recovery</a:t>
-            </a:r>
-          </a:p>
-        </p:txBody>
-      </p:sp>
-      <p:sp>
-        <p:nvSpPr>
-          <p:cNvPr id="3" name="Content Placeholder 2">
-            <a:extLst>
-              <a:ext uri="{FF2B5EF4-FFF2-40B4-BE49-F238E27FC236}">
-                <a16:creationId xmlns:a16="http://schemas.microsoft.com/office/drawing/2014/main" id="{C29FA815-F1A1-E848-8BE0-A481039CE411}"/>
-              </a:ext>
-            </a:extLst>
-          </p:cNvPr>
-          <p:cNvSpPr>
-            <a:spLocks noGrp="1"/>
-          </p:cNvSpPr>
-          <p:nvPr>
-            <p:ph idx="1"/>
-          </p:nvPr>
-        </p:nvSpPr>
-        <p:spPr>
-          <a:xfrm>
-            <a:off x="913795" y="2076450"/>
-            <a:ext cx="10353762" cy="4171950"/>
-          </a:xfrm>
-        </p:spPr>
-        <p:txBody>
-          <a:bodyPr>
-            <a:normAutofit/>
-          </a:bodyPr>
-          <a:lstStyle/>
-          <a:p>
-            <a:r>
-              <a:rPr lang="en-AU" dirty="0">
-                <a:effectLst/>
-              </a:rPr>
-              <a:t>Eradication and recovery may involve rebuilding computers or recovering from backups</a:t>
-            </a:r>
-          </a:p>
-          <a:p>
-            <a:r>
-              <a:rPr lang="en-AU" dirty="0">
-                <a:effectLst/>
-              </a:rPr>
-              <a:t>Must ensure that all malware is removed</a:t>
-            </a:r>
-          </a:p>
-          <a:p>
-            <a:r>
-              <a:rPr lang="en-AU" dirty="0">
-                <a:effectLst/>
-              </a:rPr>
-              <a:t>Update accounts</a:t>
-            </a:r>
-          </a:p>
-          <a:p>
-            <a:endParaRPr lang="en-AU" dirty="0">
-              <a:effectLst/>
-            </a:endParaRPr>
-          </a:p>
-          <a:p>
-            <a:endParaRPr lang="en-AU" dirty="0"/>
-          </a:p>
-          <a:p>
-            <a:endParaRPr lang="en-US" dirty="0"/>
-          </a:p>
-          <a:p>
-            <a:pPr marL="36900" indent="0">
-              <a:buNone/>
-            </a:pPr>
-            <a:endParaRPr lang="en-AU" dirty="0">
-              <a:effectLst/>
-            </a:endParaRPr>
-          </a:p>
-          <a:p>
-            <a:endParaRPr lang="en-AU" sz="2000" dirty="0"/>
-          </a:p>
-        </p:txBody>
-      </p:sp>
-    </p:spTree>
-    <p:extLst>
-      <p:ext uri="{BB962C8B-B14F-4D97-AF65-F5344CB8AC3E}">
-        <p14:creationId xmlns:p14="http://schemas.microsoft.com/office/powerpoint/2010/main" val="3196436922"/>
-      </p:ext>
-    </p:extLst>
-  </p:cSld>
-  <p:clrMapOvr>
-    <a:masterClrMapping/>
-  </p:clrMapOvr>
-</p:sld>
-</file>
-
-<file path=ppt/slides/slide19.xml><?xml version="1.0" encoding="utf-8"?>
-<p:sld xmlns:a="http://schemas.openxmlformats.org/drawingml/2006/main" xmlns:r="http://schemas.openxmlformats.org/officeDocument/2006/relationships" xmlns:p="http://schemas.openxmlformats.org/presentationml/2006/main">
-  <p:cSld>
-    <p:spTree>
-      <p:nvGrpSpPr>
-        <p:cNvPr id="1" name=""/>
-        <p:cNvGrpSpPr/>
-        <p:nvPr/>
-      </p:nvGrpSpPr>
-      <p:grpSpPr>
-        <a:xfrm>
-          <a:off x="0" y="0"/>
-          <a:ext cx="0" cy="0"/>
-          <a:chOff x="0" y="0"/>
-          <a:chExt cx="0" cy="0"/>
-        </a:xfrm>
-      </p:grpSpPr>
-      <p:sp>
-        <p:nvSpPr>
-          <p:cNvPr id="2" name="Title 1">
-            <a:extLst>
-              <a:ext uri="{FF2B5EF4-FFF2-40B4-BE49-F238E27FC236}">
-                <a16:creationId xmlns:a16="http://schemas.microsoft.com/office/drawing/2014/main" id="{07F6FF8C-A74B-E640-AF2F-9B4E07A213CF}"/>
-              </a:ext>
-            </a:extLst>
-          </p:cNvPr>
-          <p:cNvSpPr>
-            <a:spLocks noGrp="1"/>
-          </p:cNvSpPr>
-          <p:nvPr>
-            <p:ph type="title"/>
-          </p:nvPr>
-        </p:nvSpPr>
-        <p:spPr/>
-        <p:txBody>
-          <a:bodyPr/>
-          <a:lstStyle/>
-          <a:p>
-            <a:r>
-              <a:rPr lang="en-AU" dirty="0"/>
-              <a:t>Incident Post-Incident Activity</a:t>
-            </a:r>
-          </a:p>
-        </p:txBody>
-      </p:sp>
-      <p:sp>
-        <p:nvSpPr>
-          <p:cNvPr id="3" name="Content Placeholder 2">
-            <a:extLst>
-              <a:ext uri="{FF2B5EF4-FFF2-40B4-BE49-F238E27FC236}">
-                <a16:creationId xmlns:a16="http://schemas.microsoft.com/office/drawing/2014/main" id="{C29FA815-F1A1-E848-8BE0-A481039CE411}"/>
-              </a:ext>
-            </a:extLst>
-          </p:cNvPr>
-          <p:cNvSpPr>
-            <a:spLocks noGrp="1"/>
-          </p:cNvSpPr>
-          <p:nvPr>
-            <p:ph idx="1"/>
-          </p:nvPr>
-        </p:nvSpPr>
-        <p:spPr>
-          <a:xfrm>
-            <a:off x="913795" y="2076450"/>
-            <a:ext cx="10353762" cy="4171950"/>
-          </a:xfrm>
-        </p:spPr>
-        <p:txBody>
-          <a:bodyPr>
-            <a:normAutofit/>
-          </a:bodyPr>
-          <a:lstStyle/>
-          <a:p>
-            <a:r>
-              <a:rPr lang="en-AU" dirty="0">
-                <a:effectLst/>
-              </a:rPr>
-              <a:t>Lessons learned</a:t>
-            </a:r>
-          </a:p>
-          <a:p>
-            <a:r>
-              <a:rPr lang="en-AU" dirty="0">
-                <a:effectLst/>
-              </a:rPr>
-              <a:t>Breach notification to appropriate authorities</a:t>
-            </a:r>
-          </a:p>
-          <a:p>
-            <a:r>
-              <a:rPr lang="en-AU" dirty="0">
-                <a:effectLst/>
-              </a:rPr>
-              <a:t>Notification of affected users and follow-up</a:t>
-            </a:r>
-          </a:p>
-          <a:p>
-            <a:r>
-              <a:rPr lang="en-AU" dirty="0">
-                <a:effectLst/>
-              </a:rPr>
-              <a:t>Reputation management</a:t>
-            </a:r>
-          </a:p>
-          <a:p>
-            <a:r>
-              <a:rPr lang="en-AU" dirty="0">
-                <a:effectLst/>
-              </a:rPr>
-              <a:t>Insurance claims</a:t>
-            </a:r>
-          </a:p>
-          <a:p>
-            <a:r>
-              <a:rPr lang="en-AU" dirty="0">
-                <a:effectLst/>
-              </a:rPr>
-              <a:t>Analysis of incident data</a:t>
-            </a:r>
-          </a:p>
-          <a:p>
-            <a:endParaRPr lang="en-AU" dirty="0">
-              <a:effectLst/>
-            </a:endParaRPr>
-          </a:p>
-          <a:p>
-            <a:endParaRPr lang="en-AU" dirty="0">
-              <a:effectLst/>
-            </a:endParaRPr>
-          </a:p>
-          <a:p>
-            <a:endParaRPr lang="en-AU" dirty="0">
-              <a:effectLst/>
-            </a:endParaRPr>
-          </a:p>
-          <a:p>
-            <a:endParaRPr lang="en-AU" dirty="0"/>
-          </a:p>
-          <a:p>
-            <a:endParaRPr lang="en-US" dirty="0"/>
-          </a:p>
-          <a:p>
-            <a:pPr marL="36900" indent="0">
-              <a:buNone/>
-            </a:pPr>
-            <a:endParaRPr lang="en-AU" dirty="0">
-              <a:effectLst/>
-            </a:endParaRPr>
-          </a:p>
-          <a:p>
-            <a:endParaRPr lang="en-AU" sz="2000" dirty="0"/>
-          </a:p>
-        </p:txBody>
-      </p:sp>
-    </p:spTree>
-    <p:extLst>
-      <p:ext uri="{BB962C8B-B14F-4D97-AF65-F5344CB8AC3E}">
-        <p14:creationId xmlns:p14="http://schemas.microsoft.com/office/powerpoint/2010/main" val="860627114"/>
-      </p:ext>
-    </p:extLst>
-  </p:cSld>
-  <p:clrMapOvr>
-    <a:masterClrMapping/>
-  </p:clrMapOvr>
-</p:sld>
-</file>
-
-<file path=ppt/slides/slide2.xml><?xml version="1.0" encoding="utf-8"?>
+<file path=ppt/slides/slide3.xml><?xml version="1.0" encoding="utf-8"?>
 <p:sld xmlns:a="http://schemas.openxmlformats.org/drawingml/2006/main" xmlns:r="http://schemas.openxmlformats.org/officeDocument/2006/relationships" xmlns:p="http://schemas.openxmlformats.org/presentationml/2006/main">
   <p:cSld>
     <p:bg>
@@ -15662,7 +16246,837 @@
       </p:grpSpPr>
       <p:sp>
         <p:nvSpPr>
-          <p:cNvPr id="73" name="Rectangle 72">
+          <p:cNvPr id="2" name="Title 1">
+            <a:extLst>
+              <a:ext uri="{FF2B5EF4-FFF2-40B4-BE49-F238E27FC236}">
+                <a16:creationId xmlns:a16="http://schemas.microsoft.com/office/drawing/2014/main" id="{07F6FF8C-A74B-E640-AF2F-9B4E07A213CF}"/>
+              </a:ext>
+            </a:extLst>
+          </p:cNvPr>
+          <p:cNvSpPr>
+            <a:spLocks noGrp="1"/>
+          </p:cNvSpPr>
+          <p:nvPr>
+            <p:ph type="title"/>
+          </p:nvPr>
+        </p:nvSpPr>
+        <p:spPr>
+          <a:xfrm>
+            <a:off x="913795" y="609600"/>
+            <a:ext cx="10353762" cy="1257300"/>
+          </a:xfrm>
+        </p:spPr>
+        <p:txBody>
+          <a:bodyPr>
+            <a:normAutofit/>
+          </a:bodyPr>
+          <a:lstStyle/>
+          <a:p>
+            <a:r>
+              <a:rPr lang="en-AU" dirty="0"/>
+              <a:t>3 things</a:t>
+            </a:r>
+          </a:p>
+        </p:txBody>
+      </p:sp>
+      <p:graphicFrame>
+        <p:nvGraphicFramePr>
+          <p:cNvPr id="5" name="Content Placeholder 2">
+            <a:extLst>
+              <a:ext uri="{FF2B5EF4-FFF2-40B4-BE49-F238E27FC236}">
+                <a16:creationId xmlns:a16="http://schemas.microsoft.com/office/drawing/2014/main" id="{D9DD3D90-249D-4BBC-B94C-581C6E602BC3}"/>
+              </a:ext>
+            </a:extLst>
+          </p:cNvPr>
+          <p:cNvGraphicFramePr>
+            <a:graphicFrameLocks noGrp="1"/>
+          </p:cNvGraphicFramePr>
+          <p:nvPr>
+            <p:ph idx="1"/>
+            <p:extLst>
+              <p:ext uri="{D42A27DB-BD31-4B8C-83A1-F6EECF244321}">
+                <p14:modId xmlns:p14="http://schemas.microsoft.com/office/powerpoint/2010/main" val="2427072228"/>
+              </p:ext>
+            </p:extLst>
+          </p:nvPr>
+        </p:nvGraphicFramePr>
+        <p:xfrm>
+          <a:off x="914400" y="2076450"/>
+          <a:ext cx="10353675" cy="3714750"/>
+        </p:xfrm>
+        <a:graphic>
+          <a:graphicData uri="http://schemas.openxmlformats.org/drawingml/2006/diagram">
+            <dgm:relIds xmlns:dgm="http://schemas.openxmlformats.org/drawingml/2006/diagram" xmlns:r="http://schemas.openxmlformats.org/officeDocument/2006/relationships" r:dm="rId4" r:lo="rId5" r:qs="rId6" r:cs="rId7"/>
+          </a:graphicData>
+        </a:graphic>
+      </p:graphicFrame>
+    </p:spTree>
+    <p:extLst>
+      <p:ext uri="{BB962C8B-B14F-4D97-AF65-F5344CB8AC3E}">
+        <p14:creationId xmlns:p14="http://schemas.microsoft.com/office/powerpoint/2010/main" val="3530010058"/>
+      </p:ext>
+    </p:extLst>
+  </p:cSld>
+  <p:clrMapOvr>
+    <a:masterClrMapping/>
+  </p:clrMapOvr>
+</p:sld>
+</file>
+
+<file path=ppt/slides/slide4.xml><?xml version="1.0" encoding="utf-8"?>
+<p:sld xmlns:a="http://schemas.openxmlformats.org/drawingml/2006/main" xmlns:r="http://schemas.openxmlformats.org/officeDocument/2006/relationships" xmlns:p="http://schemas.openxmlformats.org/presentationml/2006/main">
+  <p:cSld>
+    <p:spTree>
+      <p:nvGrpSpPr>
+        <p:cNvPr id="1" name=""/>
+        <p:cNvGrpSpPr/>
+        <p:nvPr/>
+      </p:nvGrpSpPr>
+      <p:grpSpPr>
+        <a:xfrm>
+          <a:off x="0" y="0"/>
+          <a:ext cx="0" cy="0"/>
+          <a:chOff x="0" y="0"/>
+          <a:chExt cx="0" cy="0"/>
+        </a:xfrm>
+      </p:grpSpPr>
+      <p:sp>
+        <p:nvSpPr>
+          <p:cNvPr id="2" name="Title 1">
+            <a:extLst>
+              <a:ext uri="{FF2B5EF4-FFF2-40B4-BE49-F238E27FC236}">
+                <a16:creationId xmlns:a16="http://schemas.microsoft.com/office/drawing/2014/main" id="{07F6FF8C-A74B-E640-AF2F-9B4E07A213CF}"/>
+              </a:ext>
+            </a:extLst>
+          </p:cNvPr>
+          <p:cNvSpPr>
+            <a:spLocks noGrp="1"/>
+          </p:cNvSpPr>
+          <p:nvPr>
+            <p:ph type="title"/>
+          </p:nvPr>
+        </p:nvSpPr>
+        <p:spPr/>
+        <p:txBody>
+          <a:bodyPr/>
+          <a:lstStyle/>
+          <a:p>
+            <a:r>
+              <a:rPr lang="en-AU" dirty="0"/>
+              <a:t>Definition of an Incident</a:t>
+            </a:r>
+          </a:p>
+        </p:txBody>
+      </p:sp>
+      <p:sp>
+        <p:nvSpPr>
+          <p:cNvPr id="3" name="Content Placeholder 2">
+            <a:extLst>
+              <a:ext uri="{FF2B5EF4-FFF2-40B4-BE49-F238E27FC236}">
+                <a16:creationId xmlns:a16="http://schemas.microsoft.com/office/drawing/2014/main" id="{C29FA815-F1A1-E848-8BE0-A481039CE411}"/>
+              </a:ext>
+            </a:extLst>
+          </p:cNvPr>
+          <p:cNvSpPr>
+            <a:spLocks noGrp="1"/>
+          </p:cNvSpPr>
+          <p:nvPr>
+            <p:ph idx="1"/>
+          </p:nvPr>
+        </p:nvSpPr>
+        <p:spPr/>
+        <p:txBody>
+          <a:bodyPr>
+            <a:normAutofit fontScale="92500"/>
+          </a:bodyPr>
+          <a:lstStyle/>
+          <a:p>
+            <a:r>
+              <a:rPr lang="en-AU" dirty="0"/>
+              <a:t>Any event that has compromised confidentiality, integrity or availability of an organisation’s assets</a:t>
+            </a:r>
+          </a:p>
+          <a:p>
+            <a:r>
+              <a:rPr lang="en-AU" dirty="0"/>
+              <a:t>From a VERIS perspective, an incident is the result of an Actor, taking some Action, on an Asset, resulting in the Attributes of an incident, i.e., how it was affected. In this case, the action exploits a vulnerability in the asset</a:t>
+            </a:r>
+          </a:p>
+          <a:p>
+            <a:r>
+              <a:rPr lang="en-AU" dirty="0"/>
+              <a:t>An incident is when there is actual loss or imminent threat of loss. Otherwise, it is an Event</a:t>
+            </a:r>
+          </a:p>
+          <a:p>
+            <a:r>
+              <a:rPr lang="en-AU" dirty="0"/>
+              <a:t>Standard for incident handling is NIST SP800-61 it defines an incident as:</a:t>
+            </a:r>
+          </a:p>
+          <a:p>
+            <a:r>
+              <a:rPr lang="en-AU" dirty="0">
+                <a:effectLst/>
+              </a:rPr>
+              <a:t>“A computer security incident is a violation or imminent threat of violation of computer security policies, acceptable use policies, or standard security practices” </a:t>
+            </a:r>
+            <a:endParaRPr lang="en-AU" dirty="0"/>
+          </a:p>
+          <a:p>
+            <a:endParaRPr lang="en-AU" dirty="0"/>
+          </a:p>
+          <a:p>
+            <a:endParaRPr lang="en-US" dirty="0"/>
+          </a:p>
+          <a:p>
+            <a:pPr marL="36900" indent="0">
+              <a:buNone/>
+            </a:pPr>
+            <a:endParaRPr lang="en-AU" dirty="0">
+              <a:effectLst/>
+            </a:endParaRPr>
+          </a:p>
+          <a:p>
+            <a:endParaRPr lang="en-AU" sz="2000" dirty="0"/>
+          </a:p>
+        </p:txBody>
+      </p:sp>
+    </p:spTree>
+    <p:extLst>
+      <p:ext uri="{BB962C8B-B14F-4D97-AF65-F5344CB8AC3E}">
+        <p14:creationId xmlns:p14="http://schemas.microsoft.com/office/powerpoint/2010/main" val="715186591"/>
+      </p:ext>
+    </p:extLst>
+  </p:cSld>
+  <p:clrMapOvr>
+    <a:masterClrMapping/>
+  </p:clrMapOvr>
+</p:sld>
+</file>
+
+<file path=ppt/slides/slide5.xml><?xml version="1.0" encoding="utf-8"?>
+<p:sld xmlns:a="http://schemas.openxmlformats.org/drawingml/2006/main" xmlns:r="http://schemas.openxmlformats.org/officeDocument/2006/relationships" xmlns:p="http://schemas.openxmlformats.org/presentationml/2006/main">
+  <p:cSld>
+    <p:spTree>
+      <p:nvGrpSpPr>
+        <p:cNvPr id="1" name=""/>
+        <p:cNvGrpSpPr/>
+        <p:nvPr/>
+      </p:nvGrpSpPr>
+      <p:grpSpPr>
+        <a:xfrm>
+          <a:off x="0" y="0"/>
+          <a:ext cx="0" cy="0"/>
+          <a:chOff x="0" y="0"/>
+          <a:chExt cx="0" cy="0"/>
+        </a:xfrm>
+      </p:grpSpPr>
+      <p:sp>
+        <p:nvSpPr>
+          <p:cNvPr id="2" name="Title 1">
+            <a:extLst>
+              <a:ext uri="{FF2B5EF4-FFF2-40B4-BE49-F238E27FC236}">
+                <a16:creationId xmlns:a16="http://schemas.microsoft.com/office/drawing/2014/main" id="{07F6FF8C-A74B-E640-AF2F-9B4E07A213CF}"/>
+              </a:ext>
+            </a:extLst>
+          </p:cNvPr>
+          <p:cNvSpPr>
+            <a:spLocks noGrp="1"/>
+          </p:cNvSpPr>
+          <p:nvPr>
+            <p:ph type="title"/>
+          </p:nvPr>
+        </p:nvSpPr>
+        <p:spPr/>
+        <p:txBody>
+          <a:bodyPr/>
+          <a:lstStyle/>
+          <a:p>
+            <a:r>
+              <a:rPr lang="en-AU" dirty="0"/>
+              <a:t>Handling an Incident</a:t>
+            </a:r>
+          </a:p>
+        </p:txBody>
+      </p:sp>
+      <p:sp>
+        <p:nvSpPr>
+          <p:cNvPr id="3" name="Content Placeholder 2">
+            <a:extLst>
+              <a:ext uri="{FF2B5EF4-FFF2-40B4-BE49-F238E27FC236}">
+                <a16:creationId xmlns:a16="http://schemas.microsoft.com/office/drawing/2014/main" id="{C29FA815-F1A1-E848-8BE0-A481039CE411}"/>
+              </a:ext>
+            </a:extLst>
+          </p:cNvPr>
+          <p:cNvSpPr>
+            <a:spLocks noGrp="1"/>
+          </p:cNvSpPr>
+          <p:nvPr>
+            <p:ph idx="1"/>
+          </p:nvPr>
+        </p:nvSpPr>
+        <p:spPr/>
+        <p:txBody>
+          <a:bodyPr>
+            <a:normAutofit/>
+          </a:bodyPr>
+          <a:lstStyle/>
+          <a:p>
+            <a:endParaRPr lang="en-AU" dirty="0"/>
+          </a:p>
+          <a:p>
+            <a:endParaRPr lang="en-US" dirty="0"/>
+          </a:p>
+          <a:p>
+            <a:pPr marL="36900" indent="0">
+              <a:buNone/>
+            </a:pPr>
+            <a:endParaRPr lang="en-AU" dirty="0">
+              <a:effectLst/>
+            </a:endParaRPr>
+          </a:p>
+          <a:p>
+            <a:endParaRPr lang="en-AU" sz="2000" dirty="0"/>
+          </a:p>
+        </p:txBody>
+      </p:sp>
+      <p:graphicFrame>
+        <p:nvGraphicFramePr>
+          <p:cNvPr id="4" name="Diagram 3">
+            <a:extLst>
+              <a:ext uri="{FF2B5EF4-FFF2-40B4-BE49-F238E27FC236}">
+                <a16:creationId xmlns:a16="http://schemas.microsoft.com/office/drawing/2014/main" id="{7000A9BE-2B66-0442-B50F-FF3E03FAB53B}"/>
+              </a:ext>
+            </a:extLst>
+          </p:cNvPr>
+          <p:cNvGraphicFramePr/>
+          <p:nvPr>
+            <p:extLst>
+              <p:ext uri="{D42A27DB-BD31-4B8C-83A1-F6EECF244321}">
+                <p14:modId xmlns:p14="http://schemas.microsoft.com/office/powerpoint/2010/main" val="2332726913"/>
+              </p:ext>
+            </p:extLst>
+          </p:nvPr>
+        </p:nvGraphicFramePr>
+        <p:xfrm>
+          <a:off x="913795" y="719666"/>
+          <a:ext cx="10730214" cy="5418667"/>
+        </p:xfrm>
+        <a:graphic>
+          <a:graphicData uri="http://schemas.openxmlformats.org/drawingml/2006/diagram">
+            <dgm:relIds xmlns:dgm="http://schemas.openxmlformats.org/drawingml/2006/diagram" xmlns:r="http://schemas.openxmlformats.org/officeDocument/2006/relationships" r:dm="rId3" r:lo="rId4" r:qs="rId5" r:cs="rId6"/>
+          </a:graphicData>
+        </a:graphic>
+      </p:graphicFrame>
+      <p:pic>
+        <p:nvPicPr>
+          <p:cNvPr id="9" name="Picture 8" descr="Diagram, icon&#10;&#10;Description automatically generated">
+            <a:extLst>
+              <a:ext uri="{FF2B5EF4-FFF2-40B4-BE49-F238E27FC236}">
+                <a16:creationId xmlns:a16="http://schemas.microsoft.com/office/drawing/2014/main" id="{8A6D6D5E-6CFB-6844-98D7-C4F85314BD3B}"/>
+              </a:ext>
+            </a:extLst>
+          </p:cNvPr>
+          <p:cNvPicPr>
+            <a:picLocks noChangeAspect="1"/>
+          </p:cNvPicPr>
+          <p:nvPr/>
+        </p:nvPicPr>
+        <p:blipFill>
+          <a:blip r:embed="rId8"/>
+          <a:stretch>
+            <a:fillRect/>
+          </a:stretch>
+        </p:blipFill>
+        <p:spPr>
+          <a:xfrm>
+            <a:off x="2393124" y="2076450"/>
+            <a:ext cx="7395104" cy="3714750"/>
+          </a:xfrm>
+          <a:prstGeom prst="rect">
+            <a:avLst/>
+          </a:prstGeom>
+        </p:spPr>
+      </p:pic>
+    </p:spTree>
+    <p:extLst>
+      <p:ext uri="{BB962C8B-B14F-4D97-AF65-F5344CB8AC3E}">
+        <p14:creationId xmlns:p14="http://schemas.microsoft.com/office/powerpoint/2010/main" val="278219577"/>
+      </p:ext>
+    </p:extLst>
+  </p:cSld>
+  <p:clrMapOvr>
+    <a:masterClrMapping/>
+  </p:clrMapOvr>
+</p:sld>
+</file>
+
+<file path=ppt/slides/slide6.xml><?xml version="1.0" encoding="utf-8"?>
+<p:sld xmlns:a="http://schemas.openxmlformats.org/drawingml/2006/main" xmlns:r="http://schemas.openxmlformats.org/officeDocument/2006/relationships" xmlns:p="http://schemas.openxmlformats.org/presentationml/2006/main">
+  <p:cSld>
+    <p:spTree>
+      <p:nvGrpSpPr>
+        <p:cNvPr id="1" name=""/>
+        <p:cNvGrpSpPr/>
+        <p:nvPr/>
+      </p:nvGrpSpPr>
+      <p:grpSpPr>
+        <a:xfrm>
+          <a:off x="0" y="0"/>
+          <a:ext cx="0" cy="0"/>
+          <a:chOff x="0" y="0"/>
+          <a:chExt cx="0" cy="0"/>
+        </a:xfrm>
+      </p:grpSpPr>
+      <p:sp>
+        <p:nvSpPr>
+          <p:cNvPr id="2" name="Title 1">
+            <a:extLst>
+              <a:ext uri="{FF2B5EF4-FFF2-40B4-BE49-F238E27FC236}">
+                <a16:creationId xmlns:a16="http://schemas.microsoft.com/office/drawing/2014/main" id="{07F6FF8C-A74B-E640-AF2F-9B4E07A213CF}"/>
+              </a:ext>
+            </a:extLst>
+          </p:cNvPr>
+          <p:cNvSpPr>
+            <a:spLocks noGrp="1"/>
+          </p:cNvSpPr>
+          <p:nvPr>
+            <p:ph type="title"/>
+          </p:nvPr>
+        </p:nvSpPr>
+        <p:spPr/>
+        <p:txBody>
+          <a:bodyPr/>
+          <a:lstStyle/>
+          <a:p>
+            <a:r>
+              <a:rPr lang="en-AU" dirty="0"/>
+              <a:t>Note about “Hack back”</a:t>
+            </a:r>
+          </a:p>
+        </p:txBody>
+      </p:sp>
+      <p:sp>
+        <p:nvSpPr>
+          <p:cNvPr id="3" name="Content Placeholder 2">
+            <a:extLst>
+              <a:ext uri="{FF2B5EF4-FFF2-40B4-BE49-F238E27FC236}">
+                <a16:creationId xmlns:a16="http://schemas.microsoft.com/office/drawing/2014/main" id="{C29FA815-F1A1-E848-8BE0-A481039CE411}"/>
+              </a:ext>
+            </a:extLst>
+          </p:cNvPr>
+          <p:cNvSpPr>
+            <a:spLocks noGrp="1"/>
+          </p:cNvSpPr>
+          <p:nvPr>
+            <p:ph idx="1"/>
+          </p:nvPr>
+        </p:nvSpPr>
+        <p:spPr/>
+        <p:txBody>
+          <a:bodyPr>
+            <a:normAutofit/>
+          </a:bodyPr>
+          <a:lstStyle/>
+          <a:p>
+            <a:r>
+              <a:rPr lang="en-AU" dirty="0"/>
+              <a:t>In the process of investigation and remediation, there may be the temptation to take direct action against hackers. This is known as “Hack back”. </a:t>
+            </a:r>
+          </a:p>
+          <a:p>
+            <a:r>
+              <a:rPr lang="en-AU" dirty="0"/>
+              <a:t>Very few organisations or governments think this is a good idea (despite some enthusiasm from certain politicians in the US and UK)</a:t>
+            </a:r>
+          </a:p>
+          <a:p>
+            <a:r>
+              <a:rPr lang="en-AU" dirty="0"/>
+              <a:t>There is no legal basis for it as hacking back may involve other countries, other infrastructure and innocent third parties </a:t>
+            </a:r>
+          </a:p>
+          <a:p>
+            <a:r>
+              <a:rPr lang="en-AU" dirty="0"/>
+              <a:t>It is not the role of a business to engage in cyber actions and this should be left to legal authorities</a:t>
+            </a:r>
+          </a:p>
+          <a:p>
+            <a:endParaRPr lang="en-AU" dirty="0"/>
+          </a:p>
+          <a:p>
+            <a:endParaRPr lang="en-US" dirty="0"/>
+          </a:p>
+          <a:p>
+            <a:pPr marL="36900" indent="0">
+              <a:buNone/>
+            </a:pPr>
+            <a:endParaRPr lang="en-AU" dirty="0">
+              <a:effectLst/>
+            </a:endParaRPr>
+          </a:p>
+          <a:p>
+            <a:endParaRPr lang="en-AU" sz="2000" dirty="0"/>
+          </a:p>
+        </p:txBody>
+      </p:sp>
+    </p:spTree>
+    <p:extLst>
+      <p:ext uri="{BB962C8B-B14F-4D97-AF65-F5344CB8AC3E}">
+        <p14:creationId xmlns:p14="http://schemas.microsoft.com/office/powerpoint/2010/main" val="1541601130"/>
+      </p:ext>
+    </p:extLst>
+  </p:cSld>
+  <p:clrMapOvr>
+    <a:masterClrMapping/>
+  </p:clrMapOvr>
+</p:sld>
+</file>
+
+<file path=ppt/slides/slide7.xml><?xml version="1.0" encoding="utf-8"?>
+<p:sld xmlns:a="http://schemas.openxmlformats.org/drawingml/2006/main" xmlns:r="http://schemas.openxmlformats.org/officeDocument/2006/relationships" xmlns:p="http://schemas.openxmlformats.org/presentationml/2006/main">
+  <p:cSld>
+    <p:spTree>
+      <p:nvGrpSpPr>
+        <p:cNvPr id="1" name=""/>
+        <p:cNvGrpSpPr/>
+        <p:nvPr/>
+      </p:nvGrpSpPr>
+      <p:grpSpPr>
+        <a:xfrm>
+          <a:off x="0" y="0"/>
+          <a:ext cx="0" cy="0"/>
+          <a:chOff x="0" y="0"/>
+          <a:chExt cx="0" cy="0"/>
+        </a:xfrm>
+      </p:grpSpPr>
+      <p:sp>
+        <p:nvSpPr>
+          <p:cNvPr id="2" name="Title 1">
+            <a:extLst>
+              <a:ext uri="{FF2B5EF4-FFF2-40B4-BE49-F238E27FC236}">
+                <a16:creationId xmlns:a16="http://schemas.microsoft.com/office/drawing/2014/main" id="{07F6FF8C-A74B-E640-AF2F-9B4E07A213CF}"/>
+              </a:ext>
+            </a:extLst>
+          </p:cNvPr>
+          <p:cNvSpPr>
+            <a:spLocks noGrp="1"/>
+          </p:cNvSpPr>
+          <p:nvPr>
+            <p:ph type="title"/>
+          </p:nvPr>
+        </p:nvSpPr>
+        <p:spPr/>
+        <p:txBody>
+          <a:bodyPr/>
+          <a:lstStyle/>
+          <a:p>
+            <a:r>
+              <a:rPr lang="en-AU" dirty="0"/>
+              <a:t>Incidents: Incident Response Team</a:t>
+            </a:r>
+          </a:p>
+        </p:txBody>
+      </p:sp>
+      <p:sp>
+        <p:nvSpPr>
+          <p:cNvPr id="3" name="Content Placeholder 2">
+            <a:extLst>
+              <a:ext uri="{FF2B5EF4-FFF2-40B4-BE49-F238E27FC236}">
+                <a16:creationId xmlns:a16="http://schemas.microsoft.com/office/drawing/2014/main" id="{C29FA815-F1A1-E848-8BE0-A481039CE411}"/>
+              </a:ext>
+            </a:extLst>
+          </p:cNvPr>
+          <p:cNvSpPr>
+            <a:spLocks noGrp="1"/>
+          </p:cNvSpPr>
+          <p:nvPr>
+            <p:ph idx="1"/>
+          </p:nvPr>
+        </p:nvSpPr>
+        <p:spPr/>
+        <p:txBody>
+          <a:bodyPr>
+            <a:normAutofit fontScale="92500" lnSpcReduction="10000"/>
+          </a:bodyPr>
+          <a:lstStyle/>
+          <a:p>
+            <a:r>
+              <a:rPr lang="en-AU" dirty="0"/>
+              <a:t>Not all organisations can afford a dedicated incident response team</a:t>
+            </a:r>
+          </a:p>
+          <a:p>
+            <a:r>
+              <a:rPr lang="en-AU" dirty="0"/>
+              <a:t>A service offered by outside contractors as well as through </a:t>
+            </a:r>
+            <a:r>
+              <a:rPr lang="en-AU" dirty="0" err="1"/>
+              <a:t>cyberinsurance</a:t>
+            </a:r>
+            <a:r>
+              <a:rPr lang="en-AU" dirty="0"/>
+              <a:t> companies</a:t>
+            </a:r>
+          </a:p>
+          <a:p>
+            <a:r>
+              <a:rPr lang="en-AU" dirty="0"/>
+              <a:t>Need to have a variety of skills:</a:t>
+            </a:r>
+          </a:p>
+          <a:p>
+            <a:pPr lvl="1"/>
+            <a:r>
+              <a:rPr lang="en-AU" dirty="0"/>
+              <a:t>Technical: cybersecurity, programming, IT, networks, forensic cybersecurity</a:t>
+            </a:r>
+          </a:p>
+          <a:p>
+            <a:pPr lvl="1"/>
+            <a:r>
+              <a:rPr lang="en-AU" dirty="0"/>
+              <a:t>Communications: liaising with senior staff in organisation and outside organisations</a:t>
+            </a:r>
+          </a:p>
+          <a:p>
+            <a:r>
+              <a:rPr lang="en-AU" dirty="0"/>
+              <a:t>Stressful environment on 24x7 call</a:t>
+            </a:r>
+          </a:p>
+          <a:p>
+            <a:r>
+              <a:rPr lang="en-AU" dirty="0"/>
+              <a:t>Can be involved in security awareness training and also information sharing with other companies and CIRTS/CSIRTS/ISACS</a:t>
+            </a:r>
+          </a:p>
+          <a:p>
+            <a:r>
+              <a:rPr lang="en-AU" dirty="0"/>
+              <a:t>Have a Jump Bag with hardware and information needed for handling a response</a:t>
+            </a:r>
+          </a:p>
+          <a:p>
+            <a:endParaRPr lang="en-US" dirty="0"/>
+          </a:p>
+          <a:p>
+            <a:pPr marL="36900" indent="0">
+              <a:buNone/>
+            </a:pPr>
+            <a:endParaRPr lang="en-AU" dirty="0">
+              <a:effectLst/>
+            </a:endParaRPr>
+          </a:p>
+          <a:p>
+            <a:endParaRPr lang="en-AU" sz="2000" dirty="0"/>
+          </a:p>
+        </p:txBody>
+      </p:sp>
+    </p:spTree>
+    <p:extLst>
+      <p:ext uri="{BB962C8B-B14F-4D97-AF65-F5344CB8AC3E}">
+        <p14:creationId xmlns:p14="http://schemas.microsoft.com/office/powerpoint/2010/main" val="3753290195"/>
+      </p:ext>
+    </p:extLst>
+  </p:cSld>
+  <p:clrMapOvr>
+    <a:masterClrMapping/>
+  </p:clrMapOvr>
+</p:sld>
+</file>
+
+<file path=ppt/slides/slide8.xml><?xml version="1.0" encoding="utf-8"?>
+<p:sld xmlns:a="http://schemas.openxmlformats.org/drawingml/2006/main" xmlns:r="http://schemas.openxmlformats.org/officeDocument/2006/relationships" xmlns:p="http://schemas.openxmlformats.org/presentationml/2006/main">
+  <p:cSld>
+    <p:spTree>
+      <p:nvGrpSpPr>
+        <p:cNvPr id="1" name=""/>
+        <p:cNvGrpSpPr/>
+        <p:nvPr/>
+      </p:nvGrpSpPr>
+      <p:grpSpPr>
+        <a:xfrm>
+          <a:off x="0" y="0"/>
+          <a:ext cx="0" cy="0"/>
+          <a:chOff x="0" y="0"/>
+          <a:chExt cx="0" cy="0"/>
+        </a:xfrm>
+      </p:grpSpPr>
+      <p:sp>
+        <p:nvSpPr>
+          <p:cNvPr id="2" name="Title 1">
+            <a:extLst>
+              <a:ext uri="{FF2B5EF4-FFF2-40B4-BE49-F238E27FC236}">
+                <a16:creationId xmlns:a16="http://schemas.microsoft.com/office/drawing/2014/main" id="{07F6FF8C-A74B-E640-AF2F-9B4E07A213CF}"/>
+              </a:ext>
+            </a:extLst>
+          </p:cNvPr>
+          <p:cNvSpPr>
+            <a:spLocks noGrp="1"/>
+          </p:cNvSpPr>
+          <p:nvPr>
+            <p:ph type="title"/>
+          </p:nvPr>
+        </p:nvSpPr>
+        <p:spPr/>
+        <p:txBody>
+          <a:bodyPr/>
+          <a:lstStyle/>
+          <a:p>
+            <a:r>
+              <a:rPr lang="en-AU" dirty="0"/>
+              <a:t>Incidents: Detection</a:t>
+            </a:r>
+          </a:p>
+        </p:txBody>
+      </p:sp>
+      <p:sp>
+        <p:nvSpPr>
+          <p:cNvPr id="3" name="Content Placeholder 2">
+            <a:extLst>
+              <a:ext uri="{FF2B5EF4-FFF2-40B4-BE49-F238E27FC236}">
+                <a16:creationId xmlns:a16="http://schemas.microsoft.com/office/drawing/2014/main" id="{C29FA815-F1A1-E848-8BE0-A481039CE411}"/>
+              </a:ext>
+            </a:extLst>
+          </p:cNvPr>
+          <p:cNvSpPr>
+            <a:spLocks noGrp="1"/>
+          </p:cNvSpPr>
+          <p:nvPr>
+            <p:ph idx="1"/>
+          </p:nvPr>
+        </p:nvSpPr>
+        <p:spPr/>
+        <p:txBody>
+          <a:bodyPr>
+            <a:normAutofit/>
+          </a:bodyPr>
+          <a:lstStyle/>
+          <a:p>
+            <a:r>
+              <a:rPr lang="en-AU" dirty="0"/>
+              <a:t>Incidents may come to light through alerts from </a:t>
+            </a:r>
+          </a:p>
+          <a:p>
+            <a:pPr lvl="1"/>
+            <a:r>
+              <a:rPr lang="en-AU" dirty="0"/>
+              <a:t>IDPS</a:t>
+            </a:r>
+          </a:p>
+          <a:p>
+            <a:pPr lvl="1"/>
+            <a:r>
+              <a:rPr lang="en-AU" dirty="0"/>
+              <a:t>Anti-malware software</a:t>
+            </a:r>
+          </a:p>
+          <a:p>
+            <a:pPr lvl="1"/>
+            <a:r>
+              <a:rPr lang="en-AU" dirty="0"/>
+              <a:t>Users noting irregular behaviours on their computers or accounts</a:t>
+            </a:r>
+          </a:p>
+          <a:p>
+            <a:pPr lvl="1"/>
+            <a:r>
+              <a:rPr lang="en-AU" dirty="0"/>
+              <a:t>Breached data surfacing on the Dark Web or other criminal sites</a:t>
+            </a:r>
+          </a:p>
+          <a:p>
+            <a:r>
+              <a:rPr lang="en-AU" dirty="0"/>
+              <a:t>Dwell time: amount of time an attacker spent on a system before detection determined from:</a:t>
+            </a:r>
+          </a:p>
+          <a:p>
+            <a:pPr lvl="1"/>
+            <a:r>
+              <a:rPr lang="en-AU" dirty="0"/>
+              <a:t>Mean Time to Detect (MTTD) and Mean Time To Respond/Remediate (MTTR)</a:t>
+            </a:r>
+          </a:p>
+          <a:p>
+            <a:pPr marL="36900" indent="0">
+              <a:buNone/>
+            </a:pPr>
+            <a:endParaRPr lang="en-AU" dirty="0"/>
+          </a:p>
+          <a:p>
+            <a:endParaRPr lang="en-US" dirty="0"/>
+          </a:p>
+          <a:p>
+            <a:pPr marL="36900" indent="0">
+              <a:buNone/>
+            </a:pPr>
+            <a:endParaRPr lang="en-AU" dirty="0">
+              <a:effectLst/>
+            </a:endParaRPr>
+          </a:p>
+          <a:p>
+            <a:endParaRPr lang="en-AU" sz="2000" dirty="0"/>
+          </a:p>
+        </p:txBody>
+      </p:sp>
+    </p:spTree>
+    <p:extLst>
+      <p:ext uri="{BB962C8B-B14F-4D97-AF65-F5344CB8AC3E}">
+        <p14:creationId xmlns:p14="http://schemas.microsoft.com/office/powerpoint/2010/main" val="1151171978"/>
+      </p:ext>
+    </p:extLst>
+  </p:cSld>
+  <p:clrMapOvr>
+    <a:masterClrMapping/>
+  </p:clrMapOvr>
+</p:sld>
+</file>
+
+<file path=ppt/slides/slide9.xml><?xml version="1.0" encoding="utf-8"?>
+<p:sld xmlns:a="http://schemas.openxmlformats.org/drawingml/2006/main" xmlns:r="http://schemas.openxmlformats.org/officeDocument/2006/relationships" xmlns:p="http://schemas.openxmlformats.org/presentationml/2006/main">
+  <p:cSld>
+    <p:bg>
+      <p:bgPr>
+        <a:blipFill rotWithShape="1">
+          <a:blip r:embed="rId3">
+            <a:duotone>
+              <a:schemeClr val="bg1">
+                <a:shade val="80000"/>
+                <a:lumMod val="80000"/>
+              </a:schemeClr>
+              <a:schemeClr val="bg1">
+                <a:tint val="98000"/>
+              </a:schemeClr>
+            </a:duotone>
+          </a:blip>
+          <a:stretch/>
+        </a:blipFill>
+        <a:effectLst/>
+      </p:bgPr>
+    </p:bg>
+    <p:spTree>
+      <p:nvGrpSpPr>
+        <p:cNvPr id="1" name=""/>
+        <p:cNvGrpSpPr/>
+        <p:nvPr/>
+      </p:nvGrpSpPr>
+      <p:grpSpPr>
+        <a:xfrm>
+          <a:off x="0" y="0"/>
+          <a:ext cx="0" cy="0"/>
+          <a:chOff x="0" y="0"/>
+          <a:chExt cx="0" cy="0"/>
+        </a:xfrm>
+      </p:grpSpPr>
+      <p:sp>
+        <p:nvSpPr>
+          <p:cNvPr id="10" name="Rectangle 9">
             <a:extLst>
               <a:ext uri="{FF2B5EF4-FFF2-40B4-BE49-F238E27FC236}">
                 <a16:creationId xmlns:a16="http://schemas.microsoft.com/office/drawing/2014/main" id="{A98FD4FC-479A-4C2B-84A5-CF81E055FBC0}"/>
@@ -15725,7 +17139,7 @@
       </p:sp>
       <p:sp useBgFill="1">
         <p:nvSpPr>
-          <p:cNvPr id="75" name="Freeform 5">
+          <p:cNvPr id="12" name="Freeform 5">
             <a:extLst>
               <a:ext uri="{FF2B5EF4-FFF2-40B4-BE49-F238E27FC236}">
                 <a16:creationId xmlns:a16="http://schemas.microsoft.com/office/drawing/2014/main" id="{37D54B6C-87D0-4C03-8335-3955179D2B5B}"/>
@@ -15905,1421 +17319,7 @@
           </a:effectLst>
           <a:extLst>
             <a:ext uri="{91240B29-F687-4f45-9708-019B960494DF}">
-              <a14:hiddenLine xmlns="" xmlns:a14="http://schemas.microsoft.com/office/drawing/2010/main" xmlns:p14="http://schemas.microsoft.com/office/powerpoint/2010/main" xmlns:a16="http://schemas.microsoft.com/office/drawing/2014/main" w="9525">
-                <a:solidFill>
-                  <a:srgbClr val="000000"/>
-                </a:solidFill>
-                <a:round/>
-                <a:headEnd/>
-                <a:tailEnd/>
-              </a14:hiddenLine>
-            </a:ext>
-          </a:extLst>
-        </p:spPr>
-        <p:txBody>
-          <a:bodyPr vert="horz" wrap="square" lIns="91440" tIns="45720" rIns="91440" bIns="45720" numCol="1" anchor="t" anchorCtr="0" compatLnSpc="1">
-            <a:prstTxWarp prst="textNoShape">
-              <a:avLst/>
-            </a:prstTxWarp>
-          </a:bodyPr>
-          <a:lstStyle/>
-          <a:p>
-            <a:endParaRPr lang="en-US"/>
-          </a:p>
-        </p:txBody>
-      </p:sp>
-      <p:sp>
-        <p:nvSpPr>
-          <p:cNvPr id="2" name="Title 1">
-            <a:extLst>
-              <a:ext uri="{FF2B5EF4-FFF2-40B4-BE49-F238E27FC236}">
-                <a16:creationId xmlns:a16="http://schemas.microsoft.com/office/drawing/2014/main" id="{5C4F01C5-5333-2248-B03B-703C97F7CC69}"/>
-              </a:ext>
-            </a:extLst>
-          </p:cNvPr>
-          <p:cNvSpPr>
-            <a:spLocks noGrp="1"/>
-          </p:cNvSpPr>
-          <p:nvPr>
-            <p:ph type="title"/>
-          </p:nvPr>
-        </p:nvSpPr>
-        <p:spPr>
-          <a:xfrm>
-            <a:off x="1039905" y="845387"/>
-            <a:ext cx="3470310" cy="1066689"/>
-          </a:xfrm>
-        </p:spPr>
-        <p:txBody>
-          <a:bodyPr vert="horz" lIns="91440" tIns="45720" rIns="91440" bIns="45720" rtlCol="0" anchor="b">
-            <a:normAutofit/>
-          </a:bodyPr>
-          <a:lstStyle/>
-          <a:p>
-            <a:pPr algn="l"/>
-            <a:r>
-              <a:rPr lang="en-US" sz="2400" kern="1200" dirty="0">
-                <a:ln>
-                  <a:solidFill>
-                    <a:schemeClr val="bg1">
-                      <a:lumMod val="75000"/>
-                      <a:lumOff val="25000"/>
-                      <a:alpha val="10000"/>
-                    </a:schemeClr>
-                  </a:solidFill>
-                </a:ln>
-                <a:solidFill>
-                  <a:schemeClr val="tx2"/>
-                </a:solidFill>
-                <a:effectLst>
-                  <a:outerShdw blurRad="9525" dist="25400" dir="14640000" algn="tl" rotWithShape="0">
-                    <a:schemeClr val="bg1">
-                      <a:alpha val="30000"/>
-                    </a:schemeClr>
-                  </a:outerShdw>
-                </a:effectLst>
-                <a:latin typeface="+mj-lt"/>
-                <a:ea typeface="+mj-ea"/>
-                <a:cs typeface="Trebuchet MS"/>
-              </a:rPr>
-              <a:t>A unit about </a:t>
-            </a:r>
-            <a:r>
-              <a:rPr lang="en-US" sz="2400" strike="sngStrike" kern="1200" dirty="0">
-                <a:ln>
-                  <a:solidFill>
-                    <a:schemeClr val="bg1">
-                      <a:lumMod val="75000"/>
-                      <a:lumOff val="25000"/>
-                      <a:alpha val="10000"/>
-                    </a:schemeClr>
-                  </a:solidFill>
-                </a:ln>
-                <a:solidFill>
-                  <a:schemeClr val="tx2"/>
-                </a:solidFill>
-                <a:effectLst>
-                  <a:outerShdw blurRad="9525" dist="25400" dir="14640000" algn="tl" rotWithShape="0">
-                    <a:schemeClr val="bg1">
-                      <a:alpha val="30000"/>
-                    </a:schemeClr>
-                  </a:outerShdw>
-                </a:effectLst>
-                <a:latin typeface="+mj-lt"/>
-                <a:ea typeface="+mj-ea"/>
-                <a:cs typeface="Trebuchet MS"/>
-              </a:rPr>
-              <a:t>cats</a:t>
-            </a:r>
-            <a:r>
-              <a:rPr lang="en-US" sz="2400" kern="1200" dirty="0">
-                <a:ln>
-                  <a:solidFill>
-                    <a:schemeClr val="bg1">
-                      <a:lumMod val="75000"/>
-                      <a:lumOff val="25000"/>
-                      <a:alpha val="10000"/>
-                    </a:schemeClr>
-                  </a:solidFill>
-                </a:ln>
-                <a:solidFill>
-                  <a:schemeClr val="tx2"/>
-                </a:solidFill>
-                <a:effectLst>
-                  <a:outerShdw blurRad="9525" dist="25400" dir="14640000" algn="tl" rotWithShape="0">
-                    <a:schemeClr val="bg1">
-                      <a:alpha val="30000"/>
-                    </a:schemeClr>
-                  </a:outerShdw>
-                </a:effectLst>
-                <a:latin typeface="+mj-lt"/>
-                <a:ea typeface="+mj-ea"/>
-                <a:cs typeface="Trebuchet MS"/>
-              </a:rPr>
-              <a:t> cybersecurity</a:t>
-            </a:r>
-          </a:p>
-        </p:txBody>
-      </p:sp>
-      <p:sp>
-        <p:nvSpPr>
-          <p:cNvPr id="3" name="TextBox 2">
-            <a:extLst>
-              <a:ext uri="{FF2B5EF4-FFF2-40B4-BE49-F238E27FC236}">
-                <a16:creationId xmlns:a16="http://schemas.microsoft.com/office/drawing/2014/main" id="{D04A9560-61A7-8541-B04F-4C1E6892BE66}"/>
-              </a:ext>
-            </a:extLst>
-          </p:cNvPr>
-          <p:cNvSpPr txBox="1"/>
-          <p:nvPr/>
-        </p:nvSpPr>
-        <p:spPr>
-          <a:xfrm>
-            <a:off x="1039905" y="2147862"/>
-            <a:ext cx="3405573" cy="3499563"/>
-          </a:xfrm>
-          <a:prstGeom prst="rect">
-            <a:avLst/>
-          </a:prstGeom>
-        </p:spPr>
-        <p:txBody>
-          <a:bodyPr vert="horz" lIns="91440" tIns="45720" rIns="91440" bIns="45720" rtlCol="0" anchor="t">
-            <a:normAutofit/>
-          </a:bodyPr>
-          <a:lstStyle/>
-          <a:p>
-            <a:pPr defTabSz="457200">
-              <a:spcBef>
-                <a:spcPct val="20000"/>
-              </a:spcBef>
-              <a:spcAft>
-                <a:spcPts val="600"/>
-              </a:spcAft>
-              <a:buClr>
-                <a:schemeClr val="tx2"/>
-              </a:buClr>
-              <a:buSzPct val="70000"/>
-              <a:buFont typeface="Wingdings 2" charset="2"/>
-            </a:pPr>
-            <a:endParaRPr lang="en-US" sz="1600" dirty="0">
-              <a:ln>
-                <a:solidFill>
-                  <a:schemeClr val="bg1">
-                    <a:lumMod val="75000"/>
-                    <a:lumOff val="25000"/>
-                    <a:alpha val="10000"/>
-                  </a:schemeClr>
-                </a:solidFill>
-              </a:ln>
-              <a:solidFill>
-                <a:schemeClr val="tx2"/>
-              </a:solidFill>
-              <a:effectLst>
-                <a:outerShdw blurRad="9525" dist="25400" dir="14640000" algn="tl" rotWithShape="0">
-                  <a:schemeClr val="bg1">
-                    <a:alpha val="30000"/>
-                  </a:schemeClr>
-                </a:outerShdw>
-              </a:effectLst>
-            </a:endParaRPr>
-          </a:p>
-        </p:txBody>
-      </p:sp>
-      <p:pic>
-        <p:nvPicPr>
-          <p:cNvPr id="2050" name="Picture 2" descr="Last week's Binance hack highlighted two glaring issues in cybersecurity  and the integrity of the Bitcoin network.The cr… | Funny cat memes, Bad cats,  Funny animals">
-            <a:extLst>
-              <a:ext uri="{FF2B5EF4-FFF2-40B4-BE49-F238E27FC236}">
-                <a16:creationId xmlns:a16="http://schemas.microsoft.com/office/drawing/2014/main" id="{82EDB343-FF32-4D47-839B-0C9272A07A4D}"/>
-              </a:ext>
-            </a:extLst>
-          </p:cNvPr>
-          <p:cNvPicPr>
-            <a:picLocks noChangeAspect="1" noChangeArrowheads="1"/>
-          </p:cNvPicPr>
-          <p:nvPr/>
-        </p:nvPicPr>
-        <p:blipFill>
-          <a:blip r:embed="rId4">
-            <a:extLst>
-              <a:ext uri="{28A0092B-C50C-407E-A947-70E740481C1C}">
-                <a14:useLocalDpi xmlns:a14="http://schemas.microsoft.com/office/drawing/2010/main" val="0"/>
-              </a:ext>
-            </a:extLst>
-          </a:blip>
-          <a:srcRect/>
-          <a:stretch>
-            <a:fillRect/>
-          </a:stretch>
-        </p:blipFill>
-        <p:spPr bwMode="auto">
-          <a:xfrm>
-            <a:off x="6096000" y="819569"/>
-            <a:ext cx="5227319" cy="5218862"/>
-          </a:xfrm>
-          <a:prstGeom prst="rect">
-            <a:avLst/>
-          </a:prstGeom>
-          <a:noFill/>
-          <a:extLst>
-            <a:ext uri="{909E8E84-426E-40DD-AFC4-6F175D3DCCD1}">
-              <a14:hiddenFill xmlns:a14="http://schemas.microsoft.com/office/drawing/2010/main">
-                <a:solidFill>
-                  <a:srgbClr val="FFFFFF"/>
-                </a:solidFill>
-              </a14:hiddenFill>
-            </a:ext>
-          </a:extLst>
-        </p:spPr>
-      </p:pic>
-      <p:sp>
-        <p:nvSpPr>
-          <p:cNvPr id="7" name="TextBox 6">
-            <a:extLst>
-              <a:ext uri="{FF2B5EF4-FFF2-40B4-BE49-F238E27FC236}">
-                <a16:creationId xmlns:a16="http://schemas.microsoft.com/office/drawing/2014/main" id="{DCE4D174-E44F-CF4F-AA1C-D2B815E60ABC}"/>
-              </a:ext>
-            </a:extLst>
-          </p:cNvPr>
-          <p:cNvSpPr txBox="1"/>
-          <p:nvPr/>
-        </p:nvSpPr>
-        <p:spPr>
-          <a:xfrm>
-            <a:off x="1079331" y="2128644"/>
-            <a:ext cx="2893741" cy="246221"/>
-          </a:xfrm>
-          <a:prstGeom prst="rect">
-            <a:avLst/>
-          </a:prstGeom>
-          <a:noFill/>
-        </p:spPr>
-        <p:txBody>
-          <a:bodyPr wrap="none" rtlCol="0">
-            <a:spAutoFit/>
-          </a:bodyPr>
-          <a:lstStyle/>
-          <a:p>
-            <a:r>
-              <a:rPr lang="en-AU" sz="1000" dirty="0"/>
-              <a:t>https://</a:t>
-            </a:r>
-            <a:r>
-              <a:rPr lang="en-AU" sz="1000" dirty="0" err="1"/>
-              <a:t>depositphotos.com</a:t>
-            </a:r>
-            <a:r>
-              <a:rPr lang="en-AU" sz="1000" dirty="0"/>
-              <a:t>/portfolio-7863750.html</a:t>
-            </a:r>
-          </a:p>
-        </p:txBody>
-      </p:sp>
-    </p:spTree>
-    <p:extLst>
-      <p:ext uri="{BB962C8B-B14F-4D97-AF65-F5344CB8AC3E}">
-        <p14:creationId xmlns:p14="http://schemas.microsoft.com/office/powerpoint/2010/main" val="2972598590"/>
-      </p:ext>
-    </p:extLst>
-  </p:cSld>
-  <p:clrMapOvr>
-    <a:masterClrMapping/>
-  </p:clrMapOvr>
-</p:sld>
-</file>
-
-<file path=ppt/slides/slide3.xml><?xml version="1.0" encoding="utf-8"?>
-<p:sld xmlns:a="http://schemas.openxmlformats.org/drawingml/2006/main" xmlns:r="http://schemas.openxmlformats.org/officeDocument/2006/relationships" xmlns:p="http://schemas.openxmlformats.org/presentationml/2006/main">
-  <p:cSld>
-    <p:bg>
-      <p:bgPr>
-        <a:blipFill rotWithShape="1">
-          <a:blip r:embed="rId3">
-            <a:duotone>
-              <a:schemeClr val="bg1">
-                <a:shade val="80000"/>
-                <a:lumMod val="80000"/>
-              </a:schemeClr>
-              <a:schemeClr val="bg1">
-                <a:tint val="98000"/>
-              </a:schemeClr>
-            </a:duotone>
-          </a:blip>
-          <a:stretch/>
-        </a:blipFill>
-        <a:effectLst/>
-      </p:bgPr>
-    </p:bg>
-    <p:spTree>
-      <p:nvGrpSpPr>
-        <p:cNvPr id="1" name=""/>
-        <p:cNvGrpSpPr/>
-        <p:nvPr/>
-      </p:nvGrpSpPr>
-      <p:grpSpPr>
-        <a:xfrm>
-          <a:off x="0" y="0"/>
-          <a:ext cx="0" cy="0"/>
-          <a:chOff x="0" y="0"/>
-          <a:chExt cx="0" cy="0"/>
-        </a:xfrm>
-      </p:grpSpPr>
-      <p:sp>
-        <p:nvSpPr>
-          <p:cNvPr id="2" name="Title 1">
-            <a:extLst>
-              <a:ext uri="{FF2B5EF4-FFF2-40B4-BE49-F238E27FC236}">
-                <a16:creationId xmlns:a16="http://schemas.microsoft.com/office/drawing/2014/main" id="{07F6FF8C-A74B-E640-AF2F-9B4E07A213CF}"/>
-              </a:ext>
-            </a:extLst>
-          </p:cNvPr>
-          <p:cNvSpPr>
-            <a:spLocks noGrp="1"/>
-          </p:cNvSpPr>
-          <p:nvPr>
-            <p:ph type="title"/>
-          </p:nvPr>
-        </p:nvSpPr>
-        <p:spPr>
-          <a:xfrm>
-            <a:off x="913795" y="609600"/>
-            <a:ext cx="10353762" cy="1257300"/>
-          </a:xfrm>
-        </p:spPr>
-        <p:txBody>
-          <a:bodyPr>
-            <a:normAutofit/>
-          </a:bodyPr>
-          <a:lstStyle/>
-          <a:p>
-            <a:r>
-              <a:rPr lang="en-AU" dirty="0"/>
-              <a:t>3 things</a:t>
-            </a:r>
-          </a:p>
-        </p:txBody>
-      </p:sp>
-      <p:graphicFrame>
-        <p:nvGraphicFramePr>
-          <p:cNvPr id="5" name="Content Placeholder 2">
-            <a:extLst>
-              <a:ext uri="{FF2B5EF4-FFF2-40B4-BE49-F238E27FC236}">
-                <a16:creationId xmlns:a16="http://schemas.microsoft.com/office/drawing/2014/main" id="{D9DD3D90-249D-4BBC-B94C-581C6E602BC3}"/>
-              </a:ext>
-            </a:extLst>
-          </p:cNvPr>
-          <p:cNvGraphicFramePr>
-            <a:graphicFrameLocks noGrp="1"/>
-          </p:cNvGraphicFramePr>
-          <p:nvPr>
-            <p:ph idx="1"/>
-            <p:extLst>
-              <p:ext uri="{D42A27DB-BD31-4B8C-83A1-F6EECF244321}">
-                <p14:modId xmlns:p14="http://schemas.microsoft.com/office/powerpoint/2010/main" val="2427072228"/>
-              </p:ext>
-            </p:extLst>
-          </p:nvPr>
-        </p:nvGraphicFramePr>
-        <p:xfrm>
-          <a:off x="914400" y="2076450"/>
-          <a:ext cx="10353675" cy="3714750"/>
-        </p:xfrm>
-        <a:graphic>
-          <a:graphicData uri="http://schemas.openxmlformats.org/drawingml/2006/diagram">
-            <dgm:relIds xmlns:dgm="http://schemas.openxmlformats.org/drawingml/2006/diagram" xmlns:r="http://schemas.openxmlformats.org/officeDocument/2006/relationships" r:dm="rId4" r:lo="rId5" r:qs="rId6" r:cs="rId7"/>
-          </a:graphicData>
-        </a:graphic>
-      </p:graphicFrame>
-    </p:spTree>
-    <p:extLst>
-      <p:ext uri="{BB962C8B-B14F-4D97-AF65-F5344CB8AC3E}">
-        <p14:creationId xmlns:p14="http://schemas.microsoft.com/office/powerpoint/2010/main" val="3530010058"/>
-      </p:ext>
-    </p:extLst>
-  </p:cSld>
-  <p:clrMapOvr>
-    <a:masterClrMapping/>
-  </p:clrMapOvr>
-</p:sld>
-</file>
-
-<file path=ppt/slides/slide4.xml><?xml version="1.0" encoding="utf-8"?>
-<p:sld xmlns:a="http://schemas.openxmlformats.org/drawingml/2006/main" xmlns:r="http://schemas.openxmlformats.org/officeDocument/2006/relationships" xmlns:p="http://schemas.openxmlformats.org/presentationml/2006/main">
-  <p:cSld>
-    <p:spTree>
-      <p:nvGrpSpPr>
-        <p:cNvPr id="1" name=""/>
-        <p:cNvGrpSpPr/>
-        <p:nvPr/>
-      </p:nvGrpSpPr>
-      <p:grpSpPr>
-        <a:xfrm>
-          <a:off x="0" y="0"/>
-          <a:ext cx="0" cy="0"/>
-          <a:chOff x="0" y="0"/>
-          <a:chExt cx="0" cy="0"/>
-        </a:xfrm>
-      </p:grpSpPr>
-      <p:sp>
-        <p:nvSpPr>
-          <p:cNvPr id="2" name="Title 1">
-            <a:extLst>
-              <a:ext uri="{FF2B5EF4-FFF2-40B4-BE49-F238E27FC236}">
-                <a16:creationId xmlns:a16="http://schemas.microsoft.com/office/drawing/2014/main" id="{07F6FF8C-A74B-E640-AF2F-9B4E07A213CF}"/>
-              </a:ext>
-            </a:extLst>
-          </p:cNvPr>
-          <p:cNvSpPr>
-            <a:spLocks noGrp="1"/>
-          </p:cNvSpPr>
-          <p:nvPr>
-            <p:ph type="title"/>
-          </p:nvPr>
-        </p:nvSpPr>
-        <p:spPr/>
-        <p:txBody>
-          <a:bodyPr/>
-          <a:lstStyle/>
-          <a:p>
-            <a:r>
-              <a:rPr lang="en-AU" dirty="0"/>
-              <a:t>Definition of an Incident</a:t>
-            </a:r>
-          </a:p>
-        </p:txBody>
-      </p:sp>
-      <p:sp>
-        <p:nvSpPr>
-          <p:cNvPr id="3" name="Content Placeholder 2">
-            <a:extLst>
-              <a:ext uri="{FF2B5EF4-FFF2-40B4-BE49-F238E27FC236}">
-                <a16:creationId xmlns:a16="http://schemas.microsoft.com/office/drawing/2014/main" id="{C29FA815-F1A1-E848-8BE0-A481039CE411}"/>
-              </a:ext>
-            </a:extLst>
-          </p:cNvPr>
-          <p:cNvSpPr>
-            <a:spLocks noGrp="1"/>
-          </p:cNvSpPr>
-          <p:nvPr>
-            <p:ph idx="1"/>
-          </p:nvPr>
-        </p:nvSpPr>
-        <p:spPr/>
-        <p:txBody>
-          <a:bodyPr>
-            <a:normAutofit fontScale="92500"/>
-          </a:bodyPr>
-          <a:lstStyle/>
-          <a:p>
-            <a:r>
-              <a:rPr lang="en-AU" dirty="0"/>
-              <a:t>Any event that has compromised confidentiality, integrity or availability of an organisation’s assets</a:t>
-            </a:r>
-          </a:p>
-          <a:p>
-            <a:r>
-              <a:rPr lang="en-AU" dirty="0"/>
-              <a:t>From a VERIS perspective, an incident is the result of an Actor, taking some Action, on an Asset, resulting in the Attributes of an incident, i.e., how it was affected. In this case, the action exploits a vulnerability in the asset</a:t>
-            </a:r>
-          </a:p>
-          <a:p>
-            <a:r>
-              <a:rPr lang="en-AU" dirty="0"/>
-              <a:t>An incident is when there is actual loss or imminent threat of loss. Otherwise, it is an Event</a:t>
-            </a:r>
-          </a:p>
-          <a:p>
-            <a:r>
-              <a:rPr lang="en-AU" dirty="0"/>
-              <a:t>Standard for incident handling is NIST SP800-61 it defines an incident as:</a:t>
-            </a:r>
-          </a:p>
-          <a:p>
-            <a:r>
-              <a:rPr lang="en-AU" dirty="0">
-                <a:effectLst/>
-              </a:rPr>
-              <a:t>“A computer security incident is a violation or imminent threat of violation of computer security policies, acceptable use policies, or standard security practices” </a:t>
-            </a:r>
-            <a:endParaRPr lang="en-AU" dirty="0"/>
-          </a:p>
-          <a:p>
-            <a:endParaRPr lang="en-AU" dirty="0"/>
-          </a:p>
-          <a:p>
-            <a:endParaRPr lang="en-US" dirty="0"/>
-          </a:p>
-          <a:p>
-            <a:pPr marL="36900" indent="0">
-              <a:buNone/>
-            </a:pPr>
-            <a:endParaRPr lang="en-AU" dirty="0">
-              <a:effectLst/>
-            </a:endParaRPr>
-          </a:p>
-          <a:p>
-            <a:endParaRPr lang="en-AU" sz="2000" dirty="0"/>
-          </a:p>
-        </p:txBody>
-      </p:sp>
-    </p:spTree>
-    <p:extLst>
-      <p:ext uri="{BB962C8B-B14F-4D97-AF65-F5344CB8AC3E}">
-        <p14:creationId xmlns:p14="http://schemas.microsoft.com/office/powerpoint/2010/main" val="715186591"/>
-      </p:ext>
-    </p:extLst>
-  </p:cSld>
-  <p:clrMapOvr>
-    <a:masterClrMapping/>
-  </p:clrMapOvr>
-</p:sld>
-</file>
-
-<file path=ppt/slides/slide5.xml><?xml version="1.0" encoding="utf-8"?>
-<p:sld xmlns:a="http://schemas.openxmlformats.org/drawingml/2006/main" xmlns:r="http://schemas.openxmlformats.org/officeDocument/2006/relationships" xmlns:p="http://schemas.openxmlformats.org/presentationml/2006/main">
-  <p:cSld>
-    <p:spTree>
-      <p:nvGrpSpPr>
-        <p:cNvPr id="1" name=""/>
-        <p:cNvGrpSpPr/>
-        <p:nvPr/>
-      </p:nvGrpSpPr>
-      <p:grpSpPr>
-        <a:xfrm>
-          <a:off x="0" y="0"/>
-          <a:ext cx="0" cy="0"/>
-          <a:chOff x="0" y="0"/>
-          <a:chExt cx="0" cy="0"/>
-        </a:xfrm>
-      </p:grpSpPr>
-      <p:sp>
-        <p:nvSpPr>
-          <p:cNvPr id="2" name="Title 1">
-            <a:extLst>
-              <a:ext uri="{FF2B5EF4-FFF2-40B4-BE49-F238E27FC236}">
-                <a16:creationId xmlns:a16="http://schemas.microsoft.com/office/drawing/2014/main" id="{07F6FF8C-A74B-E640-AF2F-9B4E07A213CF}"/>
-              </a:ext>
-            </a:extLst>
-          </p:cNvPr>
-          <p:cNvSpPr>
-            <a:spLocks noGrp="1"/>
-          </p:cNvSpPr>
-          <p:nvPr>
-            <p:ph type="title"/>
-          </p:nvPr>
-        </p:nvSpPr>
-        <p:spPr/>
-        <p:txBody>
-          <a:bodyPr/>
-          <a:lstStyle/>
-          <a:p>
-            <a:r>
-              <a:rPr lang="en-AU" dirty="0"/>
-              <a:t>Handling an Incident</a:t>
-            </a:r>
-          </a:p>
-        </p:txBody>
-      </p:sp>
-      <p:sp>
-        <p:nvSpPr>
-          <p:cNvPr id="3" name="Content Placeholder 2">
-            <a:extLst>
-              <a:ext uri="{FF2B5EF4-FFF2-40B4-BE49-F238E27FC236}">
-                <a16:creationId xmlns:a16="http://schemas.microsoft.com/office/drawing/2014/main" id="{C29FA815-F1A1-E848-8BE0-A481039CE411}"/>
-              </a:ext>
-            </a:extLst>
-          </p:cNvPr>
-          <p:cNvSpPr>
-            <a:spLocks noGrp="1"/>
-          </p:cNvSpPr>
-          <p:nvPr>
-            <p:ph idx="1"/>
-          </p:nvPr>
-        </p:nvSpPr>
-        <p:spPr/>
-        <p:txBody>
-          <a:bodyPr>
-            <a:normAutofit/>
-          </a:bodyPr>
-          <a:lstStyle/>
-          <a:p>
-            <a:endParaRPr lang="en-AU" dirty="0"/>
-          </a:p>
-          <a:p>
-            <a:endParaRPr lang="en-US" dirty="0"/>
-          </a:p>
-          <a:p>
-            <a:pPr marL="36900" indent="0">
-              <a:buNone/>
-            </a:pPr>
-            <a:endParaRPr lang="en-AU" dirty="0">
-              <a:effectLst/>
-            </a:endParaRPr>
-          </a:p>
-          <a:p>
-            <a:endParaRPr lang="en-AU" sz="2000" dirty="0"/>
-          </a:p>
-        </p:txBody>
-      </p:sp>
-      <p:graphicFrame>
-        <p:nvGraphicFramePr>
-          <p:cNvPr id="4" name="Diagram 3">
-            <a:extLst>
-              <a:ext uri="{FF2B5EF4-FFF2-40B4-BE49-F238E27FC236}">
-                <a16:creationId xmlns:a16="http://schemas.microsoft.com/office/drawing/2014/main" id="{7000A9BE-2B66-0442-B50F-FF3E03FAB53B}"/>
-              </a:ext>
-            </a:extLst>
-          </p:cNvPr>
-          <p:cNvGraphicFramePr/>
-          <p:nvPr>
-            <p:extLst>
-              <p:ext uri="{D42A27DB-BD31-4B8C-83A1-F6EECF244321}">
-                <p14:modId xmlns:p14="http://schemas.microsoft.com/office/powerpoint/2010/main" val="2332726913"/>
-              </p:ext>
-            </p:extLst>
-          </p:nvPr>
-        </p:nvGraphicFramePr>
-        <p:xfrm>
-          <a:off x="913795" y="719666"/>
-          <a:ext cx="10730214" cy="5418667"/>
-        </p:xfrm>
-        <a:graphic>
-          <a:graphicData uri="http://schemas.openxmlformats.org/drawingml/2006/diagram">
-            <dgm:relIds xmlns:dgm="http://schemas.openxmlformats.org/drawingml/2006/diagram" xmlns:r="http://schemas.openxmlformats.org/officeDocument/2006/relationships" r:dm="rId3" r:lo="rId4" r:qs="rId5" r:cs="rId6"/>
-          </a:graphicData>
-        </a:graphic>
-      </p:graphicFrame>
-      <p:pic>
-        <p:nvPicPr>
-          <p:cNvPr id="9" name="Picture 8" descr="Diagram, icon&#10;&#10;Description automatically generated">
-            <a:extLst>
-              <a:ext uri="{FF2B5EF4-FFF2-40B4-BE49-F238E27FC236}">
-                <a16:creationId xmlns:a16="http://schemas.microsoft.com/office/drawing/2014/main" id="{8A6D6D5E-6CFB-6844-98D7-C4F85314BD3B}"/>
-              </a:ext>
-            </a:extLst>
-          </p:cNvPr>
-          <p:cNvPicPr>
-            <a:picLocks noChangeAspect="1"/>
-          </p:cNvPicPr>
-          <p:nvPr/>
-        </p:nvPicPr>
-        <p:blipFill>
-          <a:blip r:embed="rId8"/>
-          <a:stretch>
-            <a:fillRect/>
-          </a:stretch>
-        </p:blipFill>
-        <p:spPr>
-          <a:xfrm>
-            <a:off x="2393124" y="2076450"/>
-            <a:ext cx="7395104" cy="3714750"/>
-          </a:xfrm>
-          <a:prstGeom prst="rect">
-            <a:avLst/>
-          </a:prstGeom>
-        </p:spPr>
-      </p:pic>
-    </p:spTree>
-    <p:extLst>
-      <p:ext uri="{BB962C8B-B14F-4D97-AF65-F5344CB8AC3E}">
-        <p14:creationId xmlns:p14="http://schemas.microsoft.com/office/powerpoint/2010/main" val="278219577"/>
-      </p:ext>
-    </p:extLst>
-  </p:cSld>
-  <p:clrMapOvr>
-    <a:masterClrMapping/>
-  </p:clrMapOvr>
-</p:sld>
-</file>
-
-<file path=ppt/slides/slide6.xml><?xml version="1.0" encoding="utf-8"?>
-<p:sld xmlns:a="http://schemas.openxmlformats.org/drawingml/2006/main" xmlns:r="http://schemas.openxmlformats.org/officeDocument/2006/relationships" xmlns:p="http://schemas.openxmlformats.org/presentationml/2006/main">
-  <p:cSld>
-    <p:spTree>
-      <p:nvGrpSpPr>
-        <p:cNvPr id="1" name=""/>
-        <p:cNvGrpSpPr/>
-        <p:nvPr/>
-      </p:nvGrpSpPr>
-      <p:grpSpPr>
-        <a:xfrm>
-          <a:off x="0" y="0"/>
-          <a:ext cx="0" cy="0"/>
-          <a:chOff x="0" y="0"/>
-          <a:chExt cx="0" cy="0"/>
-        </a:xfrm>
-      </p:grpSpPr>
-      <p:sp>
-        <p:nvSpPr>
-          <p:cNvPr id="2" name="Title 1">
-            <a:extLst>
-              <a:ext uri="{FF2B5EF4-FFF2-40B4-BE49-F238E27FC236}">
-                <a16:creationId xmlns:a16="http://schemas.microsoft.com/office/drawing/2014/main" id="{07F6FF8C-A74B-E640-AF2F-9B4E07A213CF}"/>
-              </a:ext>
-            </a:extLst>
-          </p:cNvPr>
-          <p:cNvSpPr>
-            <a:spLocks noGrp="1"/>
-          </p:cNvSpPr>
-          <p:nvPr>
-            <p:ph type="title"/>
-          </p:nvPr>
-        </p:nvSpPr>
-        <p:spPr/>
-        <p:txBody>
-          <a:bodyPr/>
-          <a:lstStyle/>
-          <a:p>
-            <a:r>
-              <a:rPr lang="en-AU" dirty="0"/>
-              <a:t>Note about “Hack back”</a:t>
-            </a:r>
-          </a:p>
-        </p:txBody>
-      </p:sp>
-      <p:sp>
-        <p:nvSpPr>
-          <p:cNvPr id="3" name="Content Placeholder 2">
-            <a:extLst>
-              <a:ext uri="{FF2B5EF4-FFF2-40B4-BE49-F238E27FC236}">
-                <a16:creationId xmlns:a16="http://schemas.microsoft.com/office/drawing/2014/main" id="{C29FA815-F1A1-E848-8BE0-A481039CE411}"/>
-              </a:ext>
-            </a:extLst>
-          </p:cNvPr>
-          <p:cNvSpPr>
-            <a:spLocks noGrp="1"/>
-          </p:cNvSpPr>
-          <p:nvPr>
-            <p:ph idx="1"/>
-          </p:nvPr>
-        </p:nvSpPr>
-        <p:spPr/>
-        <p:txBody>
-          <a:bodyPr>
-            <a:normAutofit/>
-          </a:bodyPr>
-          <a:lstStyle/>
-          <a:p>
-            <a:r>
-              <a:rPr lang="en-AU" dirty="0"/>
-              <a:t>In the process of investigation and remediation, there may be the temptation to take direct action against hackers. This is known as “Hack back”. </a:t>
-            </a:r>
-          </a:p>
-          <a:p>
-            <a:r>
-              <a:rPr lang="en-AU" dirty="0"/>
-              <a:t>Very few organisations or governments think this is a good idea (despite some enthusiasm from certain politicians in the US and UK)</a:t>
-            </a:r>
-          </a:p>
-          <a:p>
-            <a:r>
-              <a:rPr lang="en-AU" dirty="0"/>
-              <a:t>There is no legal basis for it as hacking back may involve other countries, other infrastructure and innocent third parties </a:t>
-            </a:r>
-          </a:p>
-          <a:p>
-            <a:r>
-              <a:rPr lang="en-AU" dirty="0"/>
-              <a:t>It is not the role of a business to engage in cyber actions and this should be left to legal authorities</a:t>
-            </a:r>
-          </a:p>
-          <a:p>
-            <a:endParaRPr lang="en-AU" dirty="0"/>
-          </a:p>
-          <a:p>
-            <a:endParaRPr lang="en-US" dirty="0"/>
-          </a:p>
-          <a:p>
-            <a:pPr marL="36900" indent="0">
-              <a:buNone/>
-            </a:pPr>
-            <a:endParaRPr lang="en-AU" dirty="0">
-              <a:effectLst/>
-            </a:endParaRPr>
-          </a:p>
-          <a:p>
-            <a:endParaRPr lang="en-AU" sz="2000" dirty="0"/>
-          </a:p>
-        </p:txBody>
-      </p:sp>
-    </p:spTree>
-    <p:extLst>
-      <p:ext uri="{BB962C8B-B14F-4D97-AF65-F5344CB8AC3E}">
-        <p14:creationId xmlns:p14="http://schemas.microsoft.com/office/powerpoint/2010/main" val="1541601130"/>
-      </p:ext>
-    </p:extLst>
-  </p:cSld>
-  <p:clrMapOvr>
-    <a:masterClrMapping/>
-  </p:clrMapOvr>
-</p:sld>
-</file>
-
-<file path=ppt/slides/slide7.xml><?xml version="1.0" encoding="utf-8"?>
-<p:sld xmlns:a="http://schemas.openxmlformats.org/drawingml/2006/main" xmlns:r="http://schemas.openxmlformats.org/officeDocument/2006/relationships" xmlns:p="http://schemas.openxmlformats.org/presentationml/2006/main">
-  <p:cSld>
-    <p:spTree>
-      <p:nvGrpSpPr>
-        <p:cNvPr id="1" name=""/>
-        <p:cNvGrpSpPr/>
-        <p:nvPr/>
-      </p:nvGrpSpPr>
-      <p:grpSpPr>
-        <a:xfrm>
-          <a:off x="0" y="0"/>
-          <a:ext cx="0" cy="0"/>
-          <a:chOff x="0" y="0"/>
-          <a:chExt cx="0" cy="0"/>
-        </a:xfrm>
-      </p:grpSpPr>
-      <p:sp>
-        <p:nvSpPr>
-          <p:cNvPr id="2" name="Title 1">
-            <a:extLst>
-              <a:ext uri="{FF2B5EF4-FFF2-40B4-BE49-F238E27FC236}">
-                <a16:creationId xmlns:a16="http://schemas.microsoft.com/office/drawing/2014/main" id="{07F6FF8C-A74B-E640-AF2F-9B4E07A213CF}"/>
-              </a:ext>
-            </a:extLst>
-          </p:cNvPr>
-          <p:cNvSpPr>
-            <a:spLocks noGrp="1"/>
-          </p:cNvSpPr>
-          <p:nvPr>
-            <p:ph type="title"/>
-          </p:nvPr>
-        </p:nvSpPr>
-        <p:spPr/>
-        <p:txBody>
-          <a:bodyPr/>
-          <a:lstStyle/>
-          <a:p>
-            <a:r>
-              <a:rPr lang="en-AU" dirty="0"/>
-              <a:t>Incidents: Incident Response Team</a:t>
-            </a:r>
-          </a:p>
-        </p:txBody>
-      </p:sp>
-      <p:sp>
-        <p:nvSpPr>
-          <p:cNvPr id="3" name="Content Placeholder 2">
-            <a:extLst>
-              <a:ext uri="{FF2B5EF4-FFF2-40B4-BE49-F238E27FC236}">
-                <a16:creationId xmlns:a16="http://schemas.microsoft.com/office/drawing/2014/main" id="{C29FA815-F1A1-E848-8BE0-A481039CE411}"/>
-              </a:ext>
-            </a:extLst>
-          </p:cNvPr>
-          <p:cNvSpPr>
-            <a:spLocks noGrp="1"/>
-          </p:cNvSpPr>
-          <p:nvPr>
-            <p:ph idx="1"/>
-          </p:nvPr>
-        </p:nvSpPr>
-        <p:spPr/>
-        <p:txBody>
-          <a:bodyPr>
-            <a:normAutofit fontScale="92500" lnSpcReduction="10000"/>
-          </a:bodyPr>
-          <a:lstStyle/>
-          <a:p>
-            <a:r>
-              <a:rPr lang="en-AU" dirty="0"/>
-              <a:t>Not all organisations can afford a dedicated incident response team</a:t>
-            </a:r>
-          </a:p>
-          <a:p>
-            <a:r>
-              <a:rPr lang="en-AU" dirty="0"/>
-              <a:t>A service offered by outside contractors as well as through </a:t>
-            </a:r>
-            <a:r>
-              <a:rPr lang="en-AU" dirty="0" err="1"/>
-              <a:t>cyberinsurance</a:t>
-            </a:r>
-            <a:r>
-              <a:rPr lang="en-AU" dirty="0"/>
-              <a:t> companies</a:t>
-            </a:r>
-          </a:p>
-          <a:p>
-            <a:r>
-              <a:rPr lang="en-AU" dirty="0"/>
-              <a:t>Need to have a variety of skills:</a:t>
-            </a:r>
-          </a:p>
-          <a:p>
-            <a:pPr lvl="1"/>
-            <a:r>
-              <a:rPr lang="en-AU" dirty="0"/>
-              <a:t>Technical: cybersecurity, programming, IT, networks, forensic cybersecurity</a:t>
-            </a:r>
-          </a:p>
-          <a:p>
-            <a:pPr lvl="1"/>
-            <a:r>
-              <a:rPr lang="en-AU" dirty="0"/>
-              <a:t>Communications: liaising with senior staff in organisation and outside organisations</a:t>
-            </a:r>
-          </a:p>
-          <a:p>
-            <a:r>
-              <a:rPr lang="en-AU" dirty="0"/>
-              <a:t>Stressful environment on 24x7 call</a:t>
-            </a:r>
-          </a:p>
-          <a:p>
-            <a:r>
-              <a:rPr lang="en-AU" dirty="0"/>
-              <a:t>Can be involved in security awareness training and also information sharing with other companies and CIRTS/CSIRTS/ISACS</a:t>
-            </a:r>
-          </a:p>
-          <a:p>
-            <a:r>
-              <a:rPr lang="en-AU" dirty="0"/>
-              <a:t>Have a Jump Bag with hardware and information needed for handling a response</a:t>
-            </a:r>
-          </a:p>
-          <a:p>
-            <a:endParaRPr lang="en-US" dirty="0"/>
-          </a:p>
-          <a:p>
-            <a:pPr marL="36900" indent="0">
-              <a:buNone/>
-            </a:pPr>
-            <a:endParaRPr lang="en-AU" dirty="0">
-              <a:effectLst/>
-            </a:endParaRPr>
-          </a:p>
-          <a:p>
-            <a:endParaRPr lang="en-AU" sz="2000" dirty="0"/>
-          </a:p>
-        </p:txBody>
-      </p:sp>
-    </p:spTree>
-    <p:extLst>
-      <p:ext uri="{BB962C8B-B14F-4D97-AF65-F5344CB8AC3E}">
-        <p14:creationId xmlns:p14="http://schemas.microsoft.com/office/powerpoint/2010/main" val="3753290195"/>
-      </p:ext>
-    </p:extLst>
-  </p:cSld>
-  <p:clrMapOvr>
-    <a:masterClrMapping/>
-  </p:clrMapOvr>
-</p:sld>
-</file>
-
-<file path=ppt/slides/slide8.xml><?xml version="1.0" encoding="utf-8"?>
-<p:sld xmlns:a="http://schemas.openxmlformats.org/drawingml/2006/main" xmlns:r="http://schemas.openxmlformats.org/officeDocument/2006/relationships" xmlns:p="http://schemas.openxmlformats.org/presentationml/2006/main">
-  <p:cSld>
-    <p:spTree>
-      <p:nvGrpSpPr>
-        <p:cNvPr id="1" name=""/>
-        <p:cNvGrpSpPr/>
-        <p:nvPr/>
-      </p:nvGrpSpPr>
-      <p:grpSpPr>
-        <a:xfrm>
-          <a:off x="0" y="0"/>
-          <a:ext cx="0" cy="0"/>
-          <a:chOff x="0" y="0"/>
-          <a:chExt cx="0" cy="0"/>
-        </a:xfrm>
-      </p:grpSpPr>
-      <p:sp>
-        <p:nvSpPr>
-          <p:cNvPr id="2" name="Title 1">
-            <a:extLst>
-              <a:ext uri="{FF2B5EF4-FFF2-40B4-BE49-F238E27FC236}">
-                <a16:creationId xmlns:a16="http://schemas.microsoft.com/office/drawing/2014/main" id="{07F6FF8C-A74B-E640-AF2F-9B4E07A213CF}"/>
-              </a:ext>
-            </a:extLst>
-          </p:cNvPr>
-          <p:cNvSpPr>
-            <a:spLocks noGrp="1"/>
-          </p:cNvSpPr>
-          <p:nvPr>
-            <p:ph type="title"/>
-          </p:nvPr>
-        </p:nvSpPr>
-        <p:spPr/>
-        <p:txBody>
-          <a:bodyPr/>
-          <a:lstStyle/>
-          <a:p>
-            <a:r>
-              <a:rPr lang="en-AU" dirty="0"/>
-              <a:t>Incidents: Detection</a:t>
-            </a:r>
-          </a:p>
-        </p:txBody>
-      </p:sp>
-      <p:sp>
-        <p:nvSpPr>
-          <p:cNvPr id="3" name="Content Placeholder 2">
-            <a:extLst>
-              <a:ext uri="{FF2B5EF4-FFF2-40B4-BE49-F238E27FC236}">
-                <a16:creationId xmlns:a16="http://schemas.microsoft.com/office/drawing/2014/main" id="{C29FA815-F1A1-E848-8BE0-A481039CE411}"/>
-              </a:ext>
-            </a:extLst>
-          </p:cNvPr>
-          <p:cNvSpPr>
-            <a:spLocks noGrp="1"/>
-          </p:cNvSpPr>
-          <p:nvPr>
-            <p:ph idx="1"/>
-          </p:nvPr>
-        </p:nvSpPr>
-        <p:spPr/>
-        <p:txBody>
-          <a:bodyPr>
-            <a:normAutofit/>
-          </a:bodyPr>
-          <a:lstStyle/>
-          <a:p>
-            <a:r>
-              <a:rPr lang="en-AU" dirty="0"/>
-              <a:t>Incidents may come to light through alerts from </a:t>
-            </a:r>
-          </a:p>
-          <a:p>
-            <a:pPr lvl="1"/>
-            <a:r>
-              <a:rPr lang="en-AU" dirty="0"/>
-              <a:t>IDPS</a:t>
-            </a:r>
-          </a:p>
-          <a:p>
-            <a:pPr lvl="1"/>
-            <a:r>
-              <a:rPr lang="en-AU" dirty="0"/>
-              <a:t>Anti-malware software</a:t>
-            </a:r>
-          </a:p>
-          <a:p>
-            <a:pPr lvl="1"/>
-            <a:r>
-              <a:rPr lang="en-AU" dirty="0"/>
-              <a:t>Users noting irregular behaviours on their computers or accounts</a:t>
-            </a:r>
-          </a:p>
-          <a:p>
-            <a:pPr lvl="1"/>
-            <a:r>
-              <a:rPr lang="en-AU" dirty="0"/>
-              <a:t>Breached data surfacing on the Dark Web or other criminal sites</a:t>
-            </a:r>
-          </a:p>
-          <a:p>
-            <a:r>
-              <a:rPr lang="en-AU" dirty="0"/>
-              <a:t>Dwell time: amount of time an attacker spent on a system before detection determined from:</a:t>
-            </a:r>
-          </a:p>
-          <a:p>
-            <a:pPr lvl="1"/>
-            <a:r>
-              <a:rPr lang="en-AU" dirty="0"/>
-              <a:t>Mean Time to Detect (MTTD) and Mean Time To Respond/Remediate (MTTR)</a:t>
-            </a:r>
-          </a:p>
-          <a:p>
-            <a:pPr marL="36900" indent="0">
-              <a:buNone/>
-            </a:pPr>
-            <a:endParaRPr lang="en-AU" dirty="0"/>
-          </a:p>
-          <a:p>
-            <a:endParaRPr lang="en-US" dirty="0"/>
-          </a:p>
-          <a:p>
-            <a:pPr marL="36900" indent="0">
-              <a:buNone/>
-            </a:pPr>
-            <a:endParaRPr lang="en-AU" dirty="0">
-              <a:effectLst/>
-            </a:endParaRPr>
-          </a:p>
-          <a:p>
-            <a:endParaRPr lang="en-AU" sz="2000" dirty="0"/>
-          </a:p>
-        </p:txBody>
-      </p:sp>
-    </p:spTree>
-    <p:extLst>
-      <p:ext uri="{BB962C8B-B14F-4D97-AF65-F5344CB8AC3E}">
-        <p14:creationId xmlns:p14="http://schemas.microsoft.com/office/powerpoint/2010/main" val="1151171978"/>
-      </p:ext>
-    </p:extLst>
-  </p:cSld>
-  <p:clrMapOvr>
-    <a:masterClrMapping/>
-  </p:clrMapOvr>
-</p:sld>
-</file>
-
-<file path=ppt/slides/slide9.xml><?xml version="1.0" encoding="utf-8"?>
-<p:sld xmlns:a="http://schemas.openxmlformats.org/drawingml/2006/main" xmlns:r="http://schemas.openxmlformats.org/officeDocument/2006/relationships" xmlns:p="http://schemas.openxmlformats.org/presentationml/2006/main">
-  <p:cSld>
-    <p:bg>
-      <p:bgPr>
-        <a:blipFill rotWithShape="1">
-          <a:blip r:embed="rId3">
-            <a:duotone>
-              <a:schemeClr val="bg1">
-                <a:shade val="80000"/>
-                <a:lumMod val="80000"/>
-              </a:schemeClr>
-              <a:schemeClr val="bg1">
-                <a:tint val="98000"/>
-              </a:schemeClr>
-            </a:duotone>
-          </a:blip>
-          <a:stretch/>
-        </a:blipFill>
-        <a:effectLst/>
-      </p:bgPr>
-    </p:bg>
-    <p:spTree>
-      <p:nvGrpSpPr>
-        <p:cNvPr id="1" name=""/>
-        <p:cNvGrpSpPr/>
-        <p:nvPr/>
-      </p:nvGrpSpPr>
-      <p:grpSpPr>
-        <a:xfrm>
-          <a:off x="0" y="0"/>
-          <a:ext cx="0" cy="0"/>
-          <a:chOff x="0" y="0"/>
-          <a:chExt cx="0" cy="0"/>
-        </a:xfrm>
-      </p:grpSpPr>
-      <p:sp>
-        <p:nvSpPr>
-          <p:cNvPr id="10" name="Rectangle 9">
-            <a:extLst>
-              <a:ext uri="{FF2B5EF4-FFF2-40B4-BE49-F238E27FC236}">
-                <a16:creationId xmlns:a16="http://schemas.microsoft.com/office/drawing/2014/main" id="{A98FD4FC-479A-4C2B-84A5-CF81E055FBC0}"/>
-              </a:ext>
-              <a:ext uri="{C183D7F6-B498-43B3-948B-1728B52AA6E4}">
-                <adec:decorative xmlns:adec="http://schemas.microsoft.com/office/drawing/2017/decorative" val="1"/>
-              </a:ext>
-            </a:extLst>
-          </p:cNvPr>
-          <p:cNvSpPr>
-            <a:spLocks noGrp="1" noRot="1" noChangeAspect="1" noMove="1" noResize="1" noEditPoints="1" noAdjustHandles="1" noChangeArrowheads="1" noChangeShapeType="1" noTextEdit="1"/>
-          </p:cNvSpPr>
-          <p:nvPr>
-            <p:extLst>
-              <p:ext uri="{386F3935-93C4-4BCD-93E2-E3B085C9AB24}">
-                <p16:designElem xmlns:p16="http://schemas.microsoft.com/office/powerpoint/2015/main" val="1"/>
-              </p:ext>
-            </p:extLst>
-          </p:nvPr>
-        </p:nvSpPr>
-        <p:spPr>
-          <a:xfrm>
-            <a:off x="0" y="0"/>
-            <a:ext cx="12192000" cy="6858000"/>
-          </a:xfrm>
-          <a:prstGeom prst="rect">
-            <a:avLst/>
-          </a:prstGeom>
-          <a:solidFill>
-            <a:srgbClr val="FFFFFF"/>
-          </a:solidFill>
-          <a:ln>
-            <a:noFill/>
-          </a:ln>
-        </p:spPr>
-        <p:style>
-          <a:lnRef idx="2">
-            <a:schemeClr val="accent1">
-              <a:shade val="50000"/>
-            </a:schemeClr>
-          </a:lnRef>
-          <a:fillRef idx="1">
-            <a:schemeClr val="accent1"/>
-          </a:fillRef>
-          <a:effectRef idx="0">
-            <a:schemeClr val="accent1"/>
-          </a:effectRef>
-          <a:fontRef idx="minor">
-            <a:schemeClr val="lt1"/>
-          </a:fontRef>
-        </p:style>
-        <p:txBody>
-          <a:bodyPr rtlCol="0" anchor="ctr"/>
-          <a:lstStyle/>
-          <a:p>
-            <a:pPr algn="ctr"/>
-            <a:endParaRPr lang="en-US"/>
-          </a:p>
-        </p:txBody>
-      </p:sp>
-      <p:sp useBgFill="1">
-        <p:nvSpPr>
-          <p:cNvPr id="12" name="Freeform 5">
-            <a:extLst>
-              <a:ext uri="{FF2B5EF4-FFF2-40B4-BE49-F238E27FC236}">
-                <a16:creationId xmlns:a16="http://schemas.microsoft.com/office/drawing/2014/main" id="{37D54B6C-87D0-4C03-8335-3955179D2B5B}"/>
-              </a:ext>
-              <a:ext uri="{C183D7F6-B498-43B3-948B-1728B52AA6E4}">
-                <adec:decorative xmlns:adec="http://schemas.microsoft.com/office/drawing/2017/decorative" val="1"/>
-              </a:ext>
-            </a:extLst>
-          </p:cNvPr>
-          <p:cNvSpPr>
-            <a:spLocks noGrp="1" noRot="1" noChangeAspect="1" noMove="1" noResize="1" noEditPoints="1" noAdjustHandles="1" noChangeArrowheads="1" noChangeShapeType="1" noTextEdit="1"/>
-          </p:cNvSpPr>
-          <p:nvPr>
-            <p:extLst>
-              <p:ext uri="{386F3935-93C4-4BCD-93E2-E3B085C9AB24}">
-                <p16:designElem xmlns:p16="http://schemas.microsoft.com/office/powerpoint/2015/main" val="1"/>
-              </p:ext>
-            </p:extLst>
-          </p:nvPr>
-        </p:nvSpPr>
-        <p:spPr bwMode="auto">
-          <a:xfrm rot="5400000">
-            <a:off x="-118536" y="1371603"/>
-            <a:ext cx="5624423" cy="4100418"/>
-          </a:xfrm>
-          <a:custGeom>
-            <a:avLst/>
-            <a:gdLst>
-              <a:gd name="T0" fmla="*/ 1577 w 1601"/>
-              <a:gd name="T1" fmla="*/ 0 h 696"/>
-              <a:gd name="T2" fmla="*/ 833 w 1601"/>
-              <a:gd name="T3" fmla="*/ 0 h 696"/>
-              <a:gd name="T4" fmla="*/ 768 w 1601"/>
-              <a:gd name="T5" fmla="*/ 0 h 696"/>
-              <a:gd name="T6" fmla="*/ 24 w 1601"/>
-              <a:gd name="T7" fmla="*/ 0 h 696"/>
-              <a:gd name="T8" fmla="*/ 0 w 1601"/>
-              <a:gd name="T9" fmla="*/ 27 h 696"/>
-              <a:gd name="T10" fmla="*/ 0 w 1601"/>
-              <a:gd name="T11" fmla="*/ 669 h 696"/>
-              <a:gd name="T12" fmla="*/ 24 w 1601"/>
-              <a:gd name="T13" fmla="*/ 696 h 696"/>
-              <a:gd name="T14" fmla="*/ 768 w 1601"/>
-              <a:gd name="T15" fmla="*/ 696 h 696"/>
-              <a:gd name="T16" fmla="*/ 833 w 1601"/>
-              <a:gd name="T17" fmla="*/ 696 h 696"/>
-              <a:gd name="T18" fmla="*/ 1577 w 1601"/>
-              <a:gd name="T19" fmla="*/ 696 h 696"/>
-              <a:gd name="T20" fmla="*/ 1601 w 1601"/>
-              <a:gd name="T21" fmla="*/ 669 h 696"/>
-              <a:gd name="T22" fmla="*/ 1601 w 1601"/>
-              <a:gd name="T23" fmla="*/ 27 h 696"/>
-              <a:gd name="T24" fmla="*/ 1577 w 1601"/>
-              <a:gd name="T25" fmla="*/ 0 h 696"/>
-            </a:gdLst>
-            <a:ahLst/>
-            <a:cxnLst>
-              <a:cxn ang="0">
-                <a:pos x="T0" y="T1"/>
-              </a:cxn>
-              <a:cxn ang="0">
-                <a:pos x="T2" y="T3"/>
-              </a:cxn>
-              <a:cxn ang="0">
-                <a:pos x="T4" y="T5"/>
-              </a:cxn>
-              <a:cxn ang="0">
-                <a:pos x="T6" y="T7"/>
-              </a:cxn>
-              <a:cxn ang="0">
-                <a:pos x="T8" y="T9"/>
-              </a:cxn>
-              <a:cxn ang="0">
-                <a:pos x="T10" y="T11"/>
-              </a:cxn>
-              <a:cxn ang="0">
-                <a:pos x="T12" y="T13"/>
-              </a:cxn>
-              <a:cxn ang="0">
-                <a:pos x="T14" y="T15"/>
-              </a:cxn>
-              <a:cxn ang="0">
-                <a:pos x="T16" y="T17"/>
-              </a:cxn>
-              <a:cxn ang="0">
-                <a:pos x="T18" y="T19"/>
-              </a:cxn>
-              <a:cxn ang="0">
-                <a:pos x="T20" y="T21"/>
-              </a:cxn>
-              <a:cxn ang="0">
-                <a:pos x="T22" y="T23"/>
-              </a:cxn>
-              <a:cxn ang="0">
-                <a:pos x="T24" y="T25"/>
-              </a:cxn>
-            </a:cxnLst>
-            <a:rect l="0" t="0" r="r" b="b"/>
-            <a:pathLst>
-              <a:path w="1601" h="696">
-                <a:moveTo>
-                  <a:pt x="1577" y="0"/>
-                </a:moveTo>
-                <a:cubicBezTo>
-                  <a:pt x="833" y="0"/>
-                  <a:pt x="833" y="0"/>
-                  <a:pt x="833" y="0"/>
-                </a:cubicBezTo>
-                <a:cubicBezTo>
-                  <a:pt x="768" y="0"/>
-                  <a:pt x="768" y="0"/>
-                  <a:pt x="768" y="0"/>
-                </a:cubicBezTo>
-                <a:cubicBezTo>
-                  <a:pt x="24" y="0"/>
-                  <a:pt x="24" y="0"/>
-                  <a:pt x="24" y="0"/>
-                </a:cubicBezTo>
-                <a:cubicBezTo>
-                  <a:pt x="11" y="0"/>
-                  <a:pt x="0" y="12"/>
-                  <a:pt x="0" y="27"/>
-                </a:cubicBezTo>
-                <a:cubicBezTo>
-                  <a:pt x="0" y="669"/>
-                  <a:pt x="0" y="669"/>
-                  <a:pt x="0" y="669"/>
-                </a:cubicBezTo>
-                <a:cubicBezTo>
-                  <a:pt x="0" y="684"/>
-                  <a:pt x="11" y="696"/>
-                  <a:pt x="24" y="696"/>
-                </a:cubicBezTo>
-                <a:cubicBezTo>
-                  <a:pt x="768" y="696"/>
-                  <a:pt x="768" y="696"/>
-                  <a:pt x="768" y="696"/>
-                </a:cubicBezTo>
-                <a:cubicBezTo>
-                  <a:pt x="833" y="696"/>
-                  <a:pt x="833" y="696"/>
-                  <a:pt x="833" y="696"/>
-                </a:cubicBezTo>
-                <a:cubicBezTo>
-                  <a:pt x="1577" y="696"/>
-                  <a:pt x="1577" y="696"/>
-                  <a:pt x="1577" y="696"/>
-                </a:cubicBezTo>
-                <a:cubicBezTo>
-                  <a:pt x="1590" y="696"/>
-                  <a:pt x="1601" y="684"/>
-                  <a:pt x="1601" y="669"/>
-                </a:cubicBezTo>
-                <a:cubicBezTo>
-                  <a:pt x="1601" y="27"/>
-                  <a:pt x="1601" y="27"/>
-                  <a:pt x="1601" y="27"/>
-                </a:cubicBezTo>
-                <a:cubicBezTo>
-                  <a:pt x="1601" y="12"/>
-                  <a:pt x="1590" y="0"/>
-                  <a:pt x="1577" y="0"/>
-                </a:cubicBezTo>
-                <a:close/>
-              </a:path>
-            </a:pathLst>
-          </a:custGeom>
-          <a:ln>
-            <a:noFill/>
-          </a:ln>
-          <a:effectLst>
-            <a:outerShdw blurRad="50800" dist="38100" dir="5400000" algn="tl" rotWithShape="0">
-              <a:srgbClr val="000000">
-                <a:alpha val="43000"/>
-              </a:srgbClr>
-            </a:outerShdw>
-          </a:effectLst>
-          <a:extLst>
-            <a:ext uri="{91240B29-F687-4f45-9708-019B960494DF}">
-              <a14:hiddenLine xmlns="" xmlns:a14="http://schemas.microsoft.com/office/drawing/2010/main" xmlns:p14="http://schemas.microsoft.com/office/powerpoint/2010/main" xmlns:a16="http://schemas.microsoft.com/office/drawing/2014/main" w="9525">
+              <a14:hiddenLine xmlns:a16="http://schemas.microsoft.com/office/drawing/2014/main" xmlns:p14="http://schemas.microsoft.com/office/powerpoint/2010/main" xmlns:a14="http://schemas.microsoft.com/office/drawing/2010/main" xmlns="" w="9525">
                 <a:solidFill>
                   <a:srgbClr val="000000"/>
                 </a:solidFill>

</xml_diff>